<commit_message>
Aggiornata presentazione comm detection
</commit_message>
<xml_diff>
--- a/Presentation_Group_6.pptx
+++ b/Presentation_Group_6.pptx
@@ -4,6 +4,9 @@
   <p:sldMasterIdLst>
     <p:sldMasterId id="2147483648" r:id="rId1"/>
   </p:sldMasterIdLst>
+  <p:notesMasterIdLst>
+    <p:notesMasterId r:id="rId22"/>
+  </p:notesMasterIdLst>
   <p:sldIdLst>
     <p:sldId id="256" r:id="rId2"/>
     <p:sldId id="257" r:id="rId3"/>
@@ -19,7 +22,12 @@
     <p:sldId id="268" r:id="rId13"/>
     <p:sldId id="269" r:id="rId14"/>
     <p:sldId id="270" r:id="rId15"/>
-    <p:sldId id="271" r:id="rId16"/>
+    <p:sldId id="272" r:id="rId16"/>
+    <p:sldId id="271" r:id="rId17"/>
+    <p:sldId id="273" r:id="rId18"/>
+    <p:sldId id="274" r:id="rId19"/>
+    <p:sldId id="275" r:id="rId20"/>
+    <p:sldId id="276" r:id="rId21"/>
   </p:sldIdLst>
   <p:sldSz cx="12192000" cy="6858000"/>
   <p:notesSz cx="6858000" cy="9144000"/>
@@ -948,6 +956,523 @@
 </pc:chgInfo>
 </file>
 
+<file path=ppt/notesMasters/notesMaster1.xml><?xml version="1.0" encoding="utf-8"?>
+<p:notesMaster xmlns:a="http://schemas.openxmlformats.org/drawingml/2006/main" xmlns:r="http://schemas.openxmlformats.org/officeDocument/2006/relationships" xmlns:p="http://schemas.openxmlformats.org/presentationml/2006/main">
+  <p:cSld>
+    <p:bg>
+      <p:bgRef idx="1001">
+        <a:schemeClr val="bg1"/>
+      </p:bgRef>
+    </p:bg>
+    <p:spTree>
+      <p:nvGrpSpPr>
+        <p:cNvPr id="1" name=""/>
+        <p:cNvGrpSpPr/>
+        <p:nvPr/>
+      </p:nvGrpSpPr>
+      <p:grpSpPr>
+        <a:xfrm>
+          <a:off x="0" y="0"/>
+          <a:ext cx="0" cy="0"/>
+          <a:chOff x="0" y="0"/>
+          <a:chExt cx="0" cy="0"/>
+        </a:xfrm>
+      </p:grpSpPr>
+      <p:sp>
+        <p:nvSpPr>
+          <p:cNvPr id="2" name="Segnaposto intestazione 1"/>
+          <p:cNvSpPr>
+            <a:spLocks noGrp="1"/>
+          </p:cNvSpPr>
+          <p:nvPr>
+            <p:ph type="hdr" sz="quarter"/>
+          </p:nvPr>
+        </p:nvSpPr>
+        <p:spPr>
+          <a:xfrm>
+            <a:off x="0" y="0"/>
+            <a:ext cx="2971800" cy="458788"/>
+          </a:xfrm>
+          <a:prstGeom prst="rect">
+            <a:avLst/>
+          </a:prstGeom>
+        </p:spPr>
+        <p:txBody>
+          <a:bodyPr vert="horz" lIns="91440" tIns="45720" rIns="91440" bIns="45720" rtlCol="0"/>
+          <a:lstStyle>
+            <a:lvl1pPr algn="l">
+              <a:defRPr sz="1200"/>
+            </a:lvl1pPr>
+          </a:lstStyle>
+          <a:p>
+            <a:endParaRPr lang="it-IT"/>
+          </a:p>
+        </p:txBody>
+      </p:sp>
+      <p:sp>
+        <p:nvSpPr>
+          <p:cNvPr id="3" name="Segnaposto data 2"/>
+          <p:cNvSpPr>
+            <a:spLocks noGrp="1"/>
+          </p:cNvSpPr>
+          <p:nvPr>
+            <p:ph type="dt" idx="1"/>
+          </p:nvPr>
+        </p:nvSpPr>
+        <p:spPr>
+          <a:xfrm>
+            <a:off x="3884613" y="0"/>
+            <a:ext cx="2971800" cy="458788"/>
+          </a:xfrm>
+          <a:prstGeom prst="rect">
+            <a:avLst/>
+          </a:prstGeom>
+        </p:spPr>
+        <p:txBody>
+          <a:bodyPr vert="horz" lIns="91440" tIns="45720" rIns="91440" bIns="45720" rtlCol="0"/>
+          <a:lstStyle>
+            <a:lvl1pPr algn="r">
+              <a:defRPr sz="1200"/>
+            </a:lvl1pPr>
+          </a:lstStyle>
+          <a:p>
+            <a:fld id="{41C9D4F0-F449-4346-9603-92ED730A6AF6}" type="datetimeFigureOut">
+              <a:rPr lang="it-IT" smtClean="0"/>
+              <a:t>29/06/2024</a:t>
+            </a:fld>
+            <a:endParaRPr lang="it-IT"/>
+          </a:p>
+        </p:txBody>
+      </p:sp>
+      <p:sp>
+        <p:nvSpPr>
+          <p:cNvPr id="4" name="Segnaposto immagine diapositiva 3"/>
+          <p:cNvSpPr>
+            <a:spLocks noGrp="1" noRot="1" noChangeAspect="1"/>
+          </p:cNvSpPr>
+          <p:nvPr>
+            <p:ph type="sldImg" idx="2"/>
+          </p:nvPr>
+        </p:nvSpPr>
+        <p:spPr>
+          <a:xfrm>
+            <a:off x="685800" y="1143000"/>
+            <a:ext cx="5486400" cy="3086100"/>
+          </a:xfrm>
+          <a:prstGeom prst="rect">
+            <a:avLst/>
+          </a:prstGeom>
+          <a:noFill/>
+          <a:ln w="12700">
+            <a:solidFill>
+              <a:prstClr val="black"/>
+            </a:solidFill>
+          </a:ln>
+        </p:spPr>
+        <p:txBody>
+          <a:bodyPr vert="horz" lIns="91440" tIns="45720" rIns="91440" bIns="45720" rtlCol="0" anchor="ctr"/>
+          <a:lstStyle/>
+          <a:p>
+            <a:endParaRPr lang="it-IT"/>
+          </a:p>
+        </p:txBody>
+      </p:sp>
+      <p:sp>
+        <p:nvSpPr>
+          <p:cNvPr id="5" name="Segnaposto note 4"/>
+          <p:cNvSpPr>
+            <a:spLocks noGrp="1"/>
+          </p:cNvSpPr>
+          <p:nvPr>
+            <p:ph type="body" sz="quarter" idx="3"/>
+          </p:nvPr>
+        </p:nvSpPr>
+        <p:spPr>
+          <a:xfrm>
+            <a:off x="685800" y="4400550"/>
+            <a:ext cx="5486400" cy="3600450"/>
+          </a:xfrm>
+          <a:prstGeom prst="rect">
+            <a:avLst/>
+          </a:prstGeom>
+        </p:spPr>
+        <p:txBody>
+          <a:bodyPr vert="horz" lIns="91440" tIns="45720" rIns="91440" bIns="45720" rtlCol="0"/>
+          <a:lstStyle/>
+          <a:p>
+            <a:pPr lvl="0"/>
+            <a:r>
+              <a:rPr lang="it-IT"/>
+              <a:t>Fare clic per modificare gli stili del testo dello schema</a:t>
+            </a:r>
+          </a:p>
+          <a:p>
+            <a:pPr lvl="1"/>
+            <a:r>
+              <a:rPr lang="it-IT"/>
+              <a:t>Secondo livello</a:t>
+            </a:r>
+          </a:p>
+          <a:p>
+            <a:pPr lvl="2"/>
+            <a:r>
+              <a:rPr lang="it-IT"/>
+              <a:t>Terzo livello</a:t>
+            </a:r>
+          </a:p>
+          <a:p>
+            <a:pPr lvl="3"/>
+            <a:r>
+              <a:rPr lang="it-IT"/>
+              <a:t>Quarto livello</a:t>
+            </a:r>
+          </a:p>
+          <a:p>
+            <a:pPr lvl="4"/>
+            <a:r>
+              <a:rPr lang="it-IT"/>
+              <a:t>Quinto livello</a:t>
+            </a:r>
+          </a:p>
+        </p:txBody>
+      </p:sp>
+      <p:sp>
+        <p:nvSpPr>
+          <p:cNvPr id="6" name="Segnaposto piè di pagina 5"/>
+          <p:cNvSpPr>
+            <a:spLocks noGrp="1"/>
+          </p:cNvSpPr>
+          <p:nvPr>
+            <p:ph type="ftr" sz="quarter" idx="4"/>
+          </p:nvPr>
+        </p:nvSpPr>
+        <p:spPr>
+          <a:xfrm>
+            <a:off x="0" y="8685213"/>
+            <a:ext cx="2971800" cy="458787"/>
+          </a:xfrm>
+          <a:prstGeom prst="rect">
+            <a:avLst/>
+          </a:prstGeom>
+        </p:spPr>
+        <p:txBody>
+          <a:bodyPr vert="horz" lIns="91440" tIns="45720" rIns="91440" bIns="45720" rtlCol="0" anchor="b"/>
+          <a:lstStyle>
+            <a:lvl1pPr algn="l">
+              <a:defRPr sz="1200"/>
+            </a:lvl1pPr>
+          </a:lstStyle>
+          <a:p>
+            <a:endParaRPr lang="it-IT"/>
+          </a:p>
+        </p:txBody>
+      </p:sp>
+      <p:sp>
+        <p:nvSpPr>
+          <p:cNvPr id="7" name="Segnaposto numero diapositiva 6"/>
+          <p:cNvSpPr>
+            <a:spLocks noGrp="1"/>
+          </p:cNvSpPr>
+          <p:nvPr>
+            <p:ph type="sldNum" sz="quarter" idx="5"/>
+          </p:nvPr>
+        </p:nvSpPr>
+        <p:spPr>
+          <a:xfrm>
+            <a:off x="3884613" y="8685213"/>
+            <a:ext cx="2971800" cy="458787"/>
+          </a:xfrm>
+          <a:prstGeom prst="rect">
+            <a:avLst/>
+          </a:prstGeom>
+        </p:spPr>
+        <p:txBody>
+          <a:bodyPr vert="horz" lIns="91440" tIns="45720" rIns="91440" bIns="45720" rtlCol="0" anchor="b"/>
+          <a:lstStyle>
+            <a:lvl1pPr algn="r">
+              <a:defRPr sz="1200"/>
+            </a:lvl1pPr>
+          </a:lstStyle>
+          <a:p>
+            <a:fld id="{827A5EB5-EB62-4047-91ED-45520A7DA98D}" type="slidenum">
+              <a:rPr lang="it-IT" smtClean="0"/>
+              <a:t>‹N›</a:t>
+            </a:fld>
+            <a:endParaRPr lang="it-IT"/>
+          </a:p>
+        </p:txBody>
+      </p:sp>
+    </p:spTree>
+    <p:extLst>
+      <p:ext uri="{BB962C8B-B14F-4D97-AF65-F5344CB8AC3E}">
+        <p14:creationId xmlns:p14="http://schemas.microsoft.com/office/powerpoint/2010/main" val="3222748436"/>
+      </p:ext>
+    </p:extLst>
+  </p:cSld>
+  <p:clrMap bg1="lt1" tx1="dk1" bg2="lt2" tx2="dk2" accent1="accent1" accent2="accent2" accent3="accent3" accent4="accent4" accent5="accent5" accent6="accent6" hlink="hlink" folHlink="folHlink"/>
+  <p:notesStyle>
+    <a:lvl1pPr marL="0" algn="l" defTabSz="914400" rtl="0" eaLnBrk="1" latinLnBrk="0" hangingPunct="1">
+      <a:defRPr sz="1200" kern="1200">
+        <a:solidFill>
+          <a:schemeClr val="tx1"/>
+        </a:solidFill>
+        <a:latin typeface="+mn-lt"/>
+        <a:ea typeface="+mn-ea"/>
+        <a:cs typeface="+mn-cs"/>
+      </a:defRPr>
+    </a:lvl1pPr>
+    <a:lvl2pPr marL="457200" algn="l" defTabSz="914400" rtl="0" eaLnBrk="1" latinLnBrk="0" hangingPunct="1">
+      <a:defRPr sz="1200" kern="1200">
+        <a:solidFill>
+          <a:schemeClr val="tx1"/>
+        </a:solidFill>
+        <a:latin typeface="+mn-lt"/>
+        <a:ea typeface="+mn-ea"/>
+        <a:cs typeface="+mn-cs"/>
+      </a:defRPr>
+    </a:lvl2pPr>
+    <a:lvl3pPr marL="914400" algn="l" defTabSz="914400" rtl="0" eaLnBrk="1" latinLnBrk="0" hangingPunct="1">
+      <a:defRPr sz="1200" kern="1200">
+        <a:solidFill>
+          <a:schemeClr val="tx1"/>
+        </a:solidFill>
+        <a:latin typeface="+mn-lt"/>
+        <a:ea typeface="+mn-ea"/>
+        <a:cs typeface="+mn-cs"/>
+      </a:defRPr>
+    </a:lvl3pPr>
+    <a:lvl4pPr marL="1371600" algn="l" defTabSz="914400" rtl="0" eaLnBrk="1" latinLnBrk="0" hangingPunct="1">
+      <a:defRPr sz="1200" kern="1200">
+        <a:solidFill>
+          <a:schemeClr val="tx1"/>
+        </a:solidFill>
+        <a:latin typeface="+mn-lt"/>
+        <a:ea typeface="+mn-ea"/>
+        <a:cs typeface="+mn-cs"/>
+      </a:defRPr>
+    </a:lvl4pPr>
+    <a:lvl5pPr marL="1828800" algn="l" defTabSz="914400" rtl="0" eaLnBrk="1" latinLnBrk="0" hangingPunct="1">
+      <a:defRPr sz="1200" kern="1200">
+        <a:solidFill>
+          <a:schemeClr val="tx1"/>
+        </a:solidFill>
+        <a:latin typeface="+mn-lt"/>
+        <a:ea typeface="+mn-ea"/>
+        <a:cs typeface="+mn-cs"/>
+      </a:defRPr>
+    </a:lvl5pPr>
+    <a:lvl6pPr marL="2286000" algn="l" defTabSz="914400" rtl="0" eaLnBrk="1" latinLnBrk="0" hangingPunct="1">
+      <a:defRPr sz="1200" kern="1200">
+        <a:solidFill>
+          <a:schemeClr val="tx1"/>
+        </a:solidFill>
+        <a:latin typeface="+mn-lt"/>
+        <a:ea typeface="+mn-ea"/>
+        <a:cs typeface="+mn-cs"/>
+      </a:defRPr>
+    </a:lvl6pPr>
+    <a:lvl7pPr marL="2743200" algn="l" defTabSz="914400" rtl="0" eaLnBrk="1" latinLnBrk="0" hangingPunct="1">
+      <a:defRPr sz="1200" kern="1200">
+        <a:solidFill>
+          <a:schemeClr val="tx1"/>
+        </a:solidFill>
+        <a:latin typeface="+mn-lt"/>
+        <a:ea typeface="+mn-ea"/>
+        <a:cs typeface="+mn-cs"/>
+      </a:defRPr>
+    </a:lvl7pPr>
+    <a:lvl8pPr marL="3200400" algn="l" defTabSz="914400" rtl="0" eaLnBrk="1" latinLnBrk="0" hangingPunct="1">
+      <a:defRPr sz="1200" kern="1200">
+        <a:solidFill>
+          <a:schemeClr val="tx1"/>
+        </a:solidFill>
+        <a:latin typeface="+mn-lt"/>
+        <a:ea typeface="+mn-ea"/>
+        <a:cs typeface="+mn-cs"/>
+      </a:defRPr>
+    </a:lvl8pPr>
+    <a:lvl9pPr marL="3657600" algn="l" defTabSz="914400" rtl="0" eaLnBrk="1" latinLnBrk="0" hangingPunct="1">
+      <a:defRPr sz="1200" kern="1200">
+        <a:solidFill>
+          <a:schemeClr val="tx1"/>
+        </a:solidFill>
+        <a:latin typeface="+mn-lt"/>
+        <a:ea typeface="+mn-ea"/>
+        <a:cs typeface="+mn-cs"/>
+      </a:defRPr>
+    </a:lvl9pPr>
+  </p:notesStyle>
+</p:notesMaster>
+</file>
+
+<file path=ppt/notesSlides/notesSlide1.xml><?xml version="1.0" encoding="utf-8"?>
+<p:notes xmlns:a="http://schemas.openxmlformats.org/drawingml/2006/main" xmlns:r="http://schemas.openxmlformats.org/officeDocument/2006/relationships" xmlns:p="http://schemas.openxmlformats.org/presentationml/2006/main">
+  <p:cSld>
+    <p:spTree>
+      <p:nvGrpSpPr>
+        <p:cNvPr id="1" name=""/>
+        <p:cNvGrpSpPr/>
+        <p:nvPr/>
+      </p:nvGrpSpPr>
+      <p:grpSpPr>
+        <a:xfrm>
+          <a:off x="0" y="0"/>
+          <a:ext cx="0" cy="0"/>
+          <a:chOff x="0" y="0"/>
+          <a:chExt cx="0" cy="0"/>
+        </a:xfrm>
+      </p:grpSpPr>
+      <p:sp>
+        <p:nvSpPr>
+          <p:cNvPr id="2" name="Segnaposto immagine diapositiva 1"/>
+          <p:cNvSpPr>
+            <a:spLocks noGrp="1" noRot="1" noChangeAspect="1"/>
+          </p:cNvSpPr>
+          <p:nvPr>
+            <p:ph type="sldImg"/>
+          </p:nvPr>
+        </p:nvSpPr>
+        <p:spPr/>
+      </p:sp>
+      <p:sp>
+        <p:nvSpPr>
+          <p:cNvPr id="3" name="Segnaposto note 2"/>
+          <p:cNvSpPr>
+            <a:spLocks noGrp="1"/>
+          </p:cNvSpPr>
+          <p:nvPr>
+            <p:ph type="body" idx="1"/>
+          </p:nvPr>
+        </p:nvSpPr>
+        <p:spPr/>
+        <p:txBody>
+          <a:bodyPr/>
+          <a:lstStyle/>
+          <a:p>
+            <a:endParaRPr lang="it-IT" dirty="0"/>
+          </a:p>
+        </p:txBody>
+      </p:sp>
+      <p:sp>
+        <p:nvSpPr>
+          <p:cNvPr id="4" name="Segnaposto numero diapositiva 3"/>
+          <p:cNvSpPr>
+            <a:spLocks noGrp="1"/>
+          </p:cNvSpPr>
+          <p:nvPr>
+            <p:ph type="sldNum" sz="quarter" idx="5"/>
+          </p:nvPr>
+        </p:nvSpPr>
+        <p:spPr/>
+        <p:txBody>
+          <a:bodyPr/>
+          <a:lstStyle/>
+          <a:p>
+            <a:fld id="{827A5EB5-EB62-4047-91ED-45520A7DA98D}" type="slidenum">
+              <a:rPr lang="it-IT" smtClean="0"/>
+              <a:t>19</a:t>
+            </a:fld>
+            <a:endParaRPr lang="it-IT"/>
+          </a:p>
+        </p:txBody>
+      </p:sp>
+    </p:spTree>
+    <p:extLst>
+      <p:ext uri="{BB962C8B-B14F-4D97-AF65-F5344CB8AC3E}">
+        <p14:creationId xmlns:p14="http://schemas.microsoft.com/office/powerpoint/2010/main" val="2852963"/>
+      </p:ext>
+    </p:extLst>
+  </p:cSld>
+  <p:clrMapOvr>
+    <a:masterClrMapping/>
+  </p:clrMapOvr>
+</p:notes>
+</file>
+
+<file path=ppt/notesSlides/notesSlide2.xml><?xml version="1.0" encoding="utf-8"?>
+<p:notes xmlns:a="http://schemas.openxmlformats.org/drawingml/2006/main" xmlns:r="http://schemas.openxmlformats.org/officeDocument/2006/relationships" xmlns:p="http://schemas.openxmlformats.org/presentationml/2006/main">
+  <p:cSld>
+    <p:spTree>
+      <p:nvGrpSpPr>
+        <p:cNvPr id="1" name=""/>
+        <p:cNvGrpSpPr/>
+        <p:nvPr/>
+      </p:nvGrpSpPr>
+      <p:grpSpPr>
+        <a:xfrm>
+          <a:off x="0" y="0"/>
+          <a:ext cx="0" cy="0"/>
+          <a:chOff x="0" y="0"/>
+          <a:chExt cx="0" cy="0"/>
+        </a:xfrm>
+      </p:grpSpPr>
+      <p:sp>
+        <p:nvSpPr>
+          <p:cNvPr id="2" name="Segnaposto immagine diapositiva 1"/>
+          <p:cNvSpPr>
+            <a:spLocks noGrp="1" noRot="1" noChangeAspect="1"/>
+          </p:cNvSpPr>
+          <p:nvPr>
+            <p:ph type="sldImg"/>
+          </p:nvPr>
+        </p:nvSpPr>
+        <p:spPr/>
+      </p:sp>
+      <p:sp>
+        <p:nvSpPr>
+          <p:cNvPr id="3" name="Segnaposto note 2"/>
+          <p:cNvSpPr>
+            <a:spLocks noGrp="1"/>
+          </p:cNvSpPr>
+          <p:nvPr>
+            <p:ph type="body" idx="1"/>
+          </p:nvPr>
+        </p:nvSpPr>
+        <p:spPr/>
+        <p:txBody>
+          <a:bodyPr/>
+          <a:lstStyle/>
+          <a:p>
+            <a:endParaRPr lang="it-IT" dirty="0"/>
+          </a:p>
+        </p:txBody>
+      </p:sp>
+      <p:sp>
+        <p:nvSpPr>
+          <p:cNvPr id="4" name="Segnaposto numero diapositiva 3"/>
+          <p:cNvSpPr>
+            <a:spLocks noGrp="1"/>
+          </p:cNvSpPr>
+          <p:nvPr>
+            <p:ph type="sldNum" sz="quarter" idx="5"/>
+          </p:nvPr>
+        </p:nvSpPr>
+        <p:spPr/>
+        <p:txBody>
+          <a:bodyPr/>
+          <a:lstStyle/>
+          <a:p>
+            <a:fld id="{827A5EB5-EB62-4047-91ED-45520A7DA98D}" type="slidenum">
+              <a:rPr lang="it-IT" smtClean="0"/>
+              <a:t>20</a:t>
+            </a:fld>
+            <a:endParaRPr lang="it-IT"/>
+          </a:p>
+        </p:txBody>
+      </p:sp>
+    </p:spTree>
+    <p:extLst>
+      <p:ext uri="{BB962C8B-B14F-4D97-AF65-F5344CB8AC3E}">
+        <p14:creationId xmlns:p14="http://schemas.microsoft.com/office/powerpoint/2010/main" val="1501739325"/>
+      </p:ext>
+    </p:extLst>
+  </p:cSld>
+  <p:clrMapOvr>
+    <a:masterClrMapping/>
+  </p:clrMapOvr>
+</p:notes>
+</file>
+
 <file path=ppt/slideLayouts/slideLayout1.xml><?xml version="1.0" encoding="utf-8"?>
 <p:sldLayout xmlns:a="http://schemas.openxmlformats.org/drawingml/2006/main" xmlns:r="http://schemas.openxmlformats.org/officeDocument/2006/relationships" xmlns:p="http://schemas.openxmlformats.org/presentationml/2006/main" type="title" preserve="1">
   <p:cSld name="Diapositiva titolo">
@@ -1095,7 +1620,7 @@
           <a:p>
             <a:fld id="{7ED2B993-C4C1-41C6-8C99-445819C1984D}" type="datetimeFigureOut">
               <a:rPr lang="it-IT" smtClean="0"/>
-              <a:t>28/06/2024</a:t>
+              <a:t>29/06/2024</a:t>
             </a:fld>
             <a:endParaRPr lang="it-IT"/>
           </a:p>
@@ -1293,7 +1818,7 @@
           <a:p>
             <a:fld id="{7ED2B993-C4C1-41C6-8C99-445819C1984D}" type="datetimeFigureOut">
               <a:rPr lang="it-IT" smtClean="0"/>
-              <a:t>28/06/2024</a:t>
+              <a:t>29/06/2024</a:t>
             </a:fld>
             <a:endParaRPr lang="it-IT"/>
           </a:p>
@@ -1501,7 +2026,7 @@
           <a:p>
             <a:fld id="{7ED2B993-C4C1-41C6-8C99-445819C1984D}" type="datetimeFigureOut">
               <a:rPr lang="it-IT" smtClean="0"/>
-              <a:t>28/06/2024</a:t>
+              <a:t>29/06/2024</a:t>
             </a:fld>
             <a:endParaRPr lang="it-IT"/>
           </a:p>
@@ -1699,7 +2224,7 @@
           <a:p>
             <a:fld id="{7ED2B993-C4C1-41C6-8C99-445819C1984D}" type="datetimeFigureOut">
               <a:rPr lang="it-IT" smtClean="0"/>
-              <a:t>28/06/2024</a:t>
+              <a:t>29/06/2024</a:t>
             </a:fld>
             <a:endParaRPr lang="it-IT"/>
           </a:p>
@@ -1974,7 +2499,7 @@
           <a:p>
             <a:fld id="{7ED2B993-C4C1-41C6-8C99-445819C1984D}" type="datetimeFigureOut">
               <a:rPr lang="it-IT" smtClean="0"/>
-              <a:t>28/06/2024</a:t>
+              <a:t>29/06/2024</a:t>
             </a:fld>
             <a:endParaRPr lang="it-IT"/>
           </a:p>
@@ -2239,7 +2764,7 @@
           <a:p>
             <a:fld id="{7ED2B993-C4C1-41C6-8C99-445819C1984D}" type="datetimeFigureOut">
               <a:rPr lang="it-IT" smtClean="0"/>
-              <a:t>28/06/2024</a:t>
+              <a:t>29/06/2024</a:t>
             </a:fld>
             <a:endParaRPr lang="it-IT"/>
           </a:p>
@@ -2651,7 +3176,7 @@
           <a:p>
             <a:fld id="{7ED2B993-C4C1-41C6-8C99-445819C1984D}" type="datetimeFigureOut">
               <a:rPr lang="it-IT" smtClean="0"/>
-              <a:t>28/06/2024</a:t>
+              <a:t>29/06/2024</a:t>
             </a:fld>
             <a:endParaRPr lang="it-IT"/>
           </a:p>
@@ -2792,7 +3317,7 @@
           <a:p>
             <a:fld id="{7ED2B993-C4C1-41C6-8C99-445819C1984D}" type="datetimeFigureOut">
               <a:rPr lang="it-IT" smtClean="0"/>
-              <a:t>28/06/2024</a:t>
+              <a:t>29/06/2024</a:t>
             </a:fld>
             <a:endParaRPr lang="it-IT"/>
           </a:p>
@@ -2905,7 +3430,7 @@
           <a:p>
             <a:fld id="{7ED2B993-C4C1-41C6-8C99-445819C1984D}" type="datetimeFigureOut">
               <a:rPr lang="it-IT" smtClean="0"/>
-              <a:t>28/06/2024</a:t>
+              <a:t>29/06/2024</a:t>
             </a:fld>
             <a:endParaRPr lang="it-IT"/>
           </a:p>
@@ -3216,7 +3741,7 @@
           <a:p>
             <a:fld id="{7ED2B993-C4C1-41C6-8C99-445819C1984D}" type="datetimeFigureOut">
               <a:rPr lang="it-IT" smtClean="0"/>
-              <a:t>28/06/2024</a:t>
+              <a:t>29/06/2024</a:t>
             </a:fld>
             <a:endParaRPr lang="it-IT"/>
           </a:p>
@@ -3504,7 +4029,7 @@
           <a:p>
             <a:fld id="{7ED2B993-C4C1-41C6-8C99-445819C1984D}" type="datetimeFigureOut">
               <a:rPr lang="it-IT" smtClean="0"/>
-              <a:t>28/06/2024</a:t>
+              <a:t>29/06/2024</a:t>
             </a:fld>
             <a:endParaRPr lang="it-IT"/>
           </a:p>
@@ -3745,7 +4270,7 @@
           <a:p>
             <a:fld id="{7ED2B993-C4C1-41C6-8C99-445819C1984D}" type="datetimeFigureOut">
               <a:rPr lang="it-IT" smtClean="0"/>
-              <a:t>28/06/2024</a:t>
+              <a:t>29/06/2024</a:t>
             </a:fld>
             <a:endParaRPr lang="it-IT"/>
           </a:p>
@@ -5911,7 +6436,1304 @@
     </p:spTree>
     <p:extLst>
       <p:ext uri="{BB962C8B-B14F-4D97-AF65-F5344CB8AC3E}">
+        <p14:creationId xmlns:p14="http://schemas.microsoft.com/office/powerpoint/2010/main" val="2313616957"/>
+      </p:ext>
+    </p:extLst>
+  </p:cSld>
+  <p:clrMapOvr>
+    <a:masterClrMapping/>
+  </p:clrMapOvr>
+</p:sld>
+</file>
+
+<file path=ppt/slides/slide16.xml><?xml version="1.0" encoding="utf-8"?>
+<p:sld xmlns:a="http://schemas.openxmlformats.org/drawingml/2006/main" xmlns:r="http://schemas.openxmlformats.org/officeDocument/2006/relationships" xmlns:p="http://schemas.openxmlformats.org/presentationml/2006/main">
+  <p:cSld>
+    <p:spTree>
+      <p:nvGrpSpPr>
+        <p:cNvPr id="1" name=""/>
+        <p:cNvGrpSpPr/>
+        <p:nvPr/>
+      </p:nvGrpSpPr>
+      <p:grpSpPr>
+        <a:xfrm>
+          <a:off x="0" y="0"/>
+          <a:ext cx="0" cy="0"/>
+          <a:chOff x="0" y="0"/>
+          <a:chExt cx="0" cy="0"/>
+        </a:xfrm>
+      </p:grpSpPr>
+      <p:sp>
+        <p:nvSpPr>
+          <p:cNvPr id="2" name="Titolo 1">
+            <a:extLst>
+              <a:ext uri="{FF2B5EF4-FFF2-40B4-BE49-F238E27FC236}">
+                <a16:creationId xmlns:a16="http://schemas.microsoft.com/office/drawing/2014/main" id="{F26C103F-8817-AE01-1C43-F87D14C1DDE2}"/>
+              </a:ext>
+            </a:extLst>
+          </p:cNvPr>
+          <p:cNvSpPr>
+            <a:spLocks noGrp="1"/>
+          </p:cNvSpPr>
+          <p:nvPr>
+            <p:ph type="title"/>
+          </p:nvPr>
+        </p:nvSpPr>
+        <p:spPr/>
+        <p:txBody>
+          <a:bodyPr/>
+          <a:lstStyle/>
+          <a:p>
+            <a:pPr algn="ctr"/>
+            <a:r>
+              <a:rPr lang="it-IT" dirty="0">
+                <a:solidFill>
+                  <a:srgbClr val="0070C0"/>
+                </a:solidFill>
+              </a:rPr>
+              <a:t>Community </a:t>
+            </a:r>
+            <a:r>
+              <a:rPr lang="it-IT" dirty="0" err="1">
+                <a:solidFill>
+                  <a:srgbClr val="0070C0"/>
+                </a:solidFill>
+              </a:rPr>
+              <a:t>detection</a:t>
+            </a:r>
+            <a:endParaRPr lang="it-IT" dirty="0">
+              <a:solidFill>
+                <a:srgbClr val="0070C0"/>
+              </a:solidFill>
+            </a:endParaRPr>
+          </a:p>
+        </p:txBody>
+      </p:sp>
+      <p:sp>
+        <p:nvSpPr>
+          <p:cNvPr id="3" name="Segnaposto contenuto 2">
+            <a:extLst>
+              <a:ext uri="{FF2B5EF4-FFF2-40B4-BE49-F238E27FC236}">
+                <a16:creationId xmlns:a16="http://schemas.microsoft.com/office/drawing/2014/main" id="{3481AE9C-5DBD-AB2C-A0D7-2361D1272888}"/>
+              </a:ext>
+            </a:extLst>
+          </p:cNvPr>
+          <p:cNvSpPr>
+            <a:spLocks noGrp="1"/>
+          </p:cNvSpPr>
+          <p:nvPr>
+            <p:ph idx="1"/>
+          </p:nvPr>
+        </p:nvSpPr>
+        <p:spPr>
+          <a:xfrm>
+            <a:off x="838200" y="1777499"/>
+            <a:ext cx="10515600" cy="4351338"/>
+          </a:xfrm>
+        </p:spPr>
+        <p:txBody>
+          <a:bodyPr>
+            <a:normAutofit lnSpcReduction="10000"/>
+          </a:bodyPr>
+          <a:lstStyle/>
+          <a:p>
+            <a:pPr marL="0" indent="0">
+              <a:buNone/>
+            </a:pPr>
+            <a:r>
+              <a:rPr lang="it-IT" sz="2400" b="1" dirty="0"/>
+              <a:t>Metodi scelti:</a:t>
+            </a:r>
+          </a:p>
+          <a:p>
+            <a:pPr marL="0" indent="0">
+              <a:buNone/>
+            </a:pPr>
+            <a:endParaRPr lang="it-IT" sz="2400" dirty="0"/>
+          </a:p>
+          <a:p>
+            <a:r>
+              <a:rPr lang="it-IT" sz="2400" b="1" dirty="0"/>
+              <a:t>Label </a:t>
+            </a:r>
+            <a:r>
+              <a:rPr lang="it-IT" sz="2400" b="1" dirty="0" err="1"/>
+              <a:t>Propagation</a:t>
+            </a:r>
+            <a:r>
+              <a:rPr lang="it-IT" sz="2400" b="1" dirty="0"/>
+              <a:t>: </a:t>
+            </a:r>
+            <a:r>
+              <a:rPr lang="it-IT" sz="2400" dirty="0"/>
+              <a:t>Rapido ma meno stabile, utile per una prima esplorazione.</a:t>
+            </a:r>
+          </a:p>
+          <a:p>
+            <a:pPr marL="0" indent="0">
+              <a:buNone/>
+            </a:pPr>
+            <a:endParaRPr lang="it-IT" sz="2400" b="1" dirty="0"/>
+          </a:p>
+          <a:p>
+            <a:r>
+              <a:rPr lang="it-IT" sz="2400" b="1" dirty="0" err="1"/>
+              <a:t>Louvain</a:t>
+            </a:r>
+            <a:r>
+              <a:rPr lang="it-IT" sz="2400" b="1" dirty="0"/>
+              <a:t> : </a:t>
+            </a:r>
+            <a:r>
+              <a:rPr lang="it-IT" sz="2400" dirty="0"/>
+              <a:t>Fornisce una buona combinazione di modularità elevata e comunità ben definite, risultando in un numero moderato di comunità di dimensioni variabili.</a:t>
+            </a:r>
+          </a:p>
+          <a:p>
+            <a:pPr marL="0" indent="0">
+              <a:buNone/>
+            </a:pPr>
+            <a:endParaRPr lang="it-IT" sz="2400" dirty="0"/>
+          </a:p>
+          <a:p>
+            <a:r>
+              <a:rPr lang="it-IT" sz="2400" b="1" dirty="0" err="1"/>
+              <a:t>Infomap</a:t>
+            </a:r>
+            <a:r>
+              <a:rPr lang="it-IT" sz="2400" b="1" dirty="0"/>
+              <a:t>: </a:t>
+            </a:r>
+            <a:r>
+              <a:rPr lang="it-IT" sz="2400" dirty="0"/>
+              <a:t>Spesso rileva più comunità di dimensioni minori, catturando dettagli nella struttura gerarchica del grafo.</a:t>
+            </a:r>
+          </a:p>
+        </p:txBody>
+      </p:sp>
+    </p:spTree>
+    <p:extLst>
+      <p:ext uri="{BB962C8B-B14F-4D97-AF65-F5344CB8AC3E}">
         <p14:creationId xmlns:p14="http://schemas.microsoft.com/office/powerpoint/2010/main" val="3265149187"/>
+      </p:ext>
+    </p:extLst>
+  </p:cSld>
+  <p:clrMapOvr>
+    <a:masterClrMapping/>
+  </p:clrMapOvr>
+</p:sld>
+</file>
+
+<file path=ppt/slides/slide17.xml><?xml version="1.0" encoding="utf-8"?>
+<p:sld xmlns:a="http://schemas.openxmlformats.org/drawingml/2006/main" xmlns:r="http://schemas.openxmlformats.org/officeDocument/2006/relationships" xmlns:p="http://schemas.openxmlformats.org/presentationml/2006/main">
+  <p:cSld>
+    <p:bg>
+      <p:bgPr>
+        <a:solidFill>
+          <a:schemeClr val="bg1"/>
+        </a:solidFill>
+        <a:effectLst/>
+      </p:bgPr>
+    </p:bg>
+    <p:spTree>
+      <p:nvGrpSpPr>
+        <p:cNvPr id="1" name=""/>
+        <p:cNvGrpSpPr/>
+        <p:nvPr/>
+      </p:nvGrpSpPr>
+      <p:grpSpPr>
+        <a:xfrm>
+          <a:off x="0" y="0"/>
+          <a:ext cx="0" cy="0"/>
+          <a:chOff x="0" y="0"/>
+          <a:chExt cx="0" cy="0"/>
+        </a:xfrm>
+      </p:grpSpPr>
+      <p:sp useBgFill="1">
+        <p:nvSpPr>
+          <p:cNvPr id="16" name="Rectangle 15">
+            <a:extLst>
+              <a:ext uri="{FF2B5EF4-FFF2-40B4-BE49-F238E27FC236}">
+                <a16:creationId xmlns:a16="http://schemas.microsoft.com/office/drawing/2014/main" id="{70155189-D96C-4527-B0EC-654B946BE615}"/>
+              </a:ext>
+              <a:ext uri="{C183D7F6-B498-43B3-948B-1728B52AA6E4}">
+                <adec:decorative xmlns:adec="http://schemas.microsoft.com/office/drawing/2017/decorative" val="1"/>
+              </a:ext>
+            </a:extLst>
+          </p:cNvPr>
+          <p:cNvSpPr>
+            <a:spLocks noGrp="1" noRot="1" noChangeAspect="1" noMove="1" noResize="1" noEditPoints="1" noAdjustHandles="1" noChangeArrowheads="1" noChangeShapeType="1" noTextEdit="1"/>
+          </p:cNvSpPr>
+          <p:nvPr>
+            <p:extLst>
+              <p:ext uri="{386F3935-93C4-4BCD-93E2-E3B085C9AB24}">
+                <p16:designElem xmlns:p16="http://schemas.microsoft.com/office/powerpoint/2015/main" val="1"/>
+              </p:ext>
+            </p:extLst>
+          </p:nvPr>
+        </p:nvSpPr>
+        <p:spPr>
+          <a:xfrm>
+            <a:off x="-1" y="0"/>
+            <a:ext cx="12188952" cy="6858000"/>
+          </a:xfrm>
+          <a:prstGeom prst="rect">
+            <a:avLst/>
+          </a:prstGeom>
+          <a:ln>
+            <a:noFill/>
+          </a:ln>
+        </p:spPr>
+        <p:style>
+          <a:lnRef idx="2">
+            <a:schemeClr val="accent1">
+              <a:shade val="50000"/>
+            </a:schemeClr>
+          </a:lnRef>
+          <a:fillRef idx="1">
+            <a:schemeClr val="accent1"/>
+          </a:fillRef>
+          <a:effectRef idx="0">
+            <a:schemeClr val="accent1"/>
+          </a:effectRef>
+          <a:fontRef idx="minor">
+            <a:schemeClr val="lt1"/>
+          </a:fontRef>
+        </p:style>
+        <p:txBody>
+          <a:bodyPr rtlCol="0" anchor="ctr"/>
+          <a:lstStyle/>
+          <a:p>
+            <a:pPr algn="ctr"/>
+            <a:endParaRPr lang="en-US"/>
+          </a:p>
+        </p:txBody>
+      </p:sp>
+      <p:pic>
+        <p:nvPicPr>
+          <p:cNvPr id="11" name="Immagine 10">
+            <a:extLst>
+              <a:ext uri="{FF2B5EF4-FFF2-40B4-BE49-F238E27FC236}">
+                <a16:creationId xmlns:a16="http://schemas.microsoft.com/office/drawing/2014/main" id="{C6810172-28CF-B257-2E79-F6250CD086C7}"/>
+              </a:ext>
+            </a:extLst>
+          </p:cNvPr>
+          <p:cNvPicPr>
+            <a:picLocks noChangeAspect="1"/>
+          </p:cNvPicPr>
+          <p:nvPr/>
+        </p:nvPicPr>
+        <p:blipFill>
+          <a:blip r:embed="rId2"/>
+          <a:stretch>
+            <a:fillRect/>
+          </a:stretch>
+        </p:blipFill>
+        <p:spPr>
+          <a:xfrm>
+            <a:off x="8209145" y="1843088"/>
+            <a:ext cx="3797536" cy="2971571"/>
+          </a:xfrm>
+          <a:prstGeom prst="rect">
+            <a:avLst/>
+          </a:prstGeom>
+        </p:spPr>
+      </p:pic>
+      <p:pic>
+        <p:nvPicPr>
+          <p:cNvPr id="9" name="Immagine 8">
+            <a:extLst>
+              <a:ext uri="{FF2B5EF4-FFF2-40B4-BE49-F238E27FC236}">
+                <a16:creationId xmlns:a16="http://schemas.microsoft.com/office/drawing/2014/main" id="{120CF9B1-6D2D-7911-51E0-FC383217B949}"/>
+              </a:ext>
+            </a:extLst>
+          </p:cNvPr>
+          <p:cNvPicPr>
+            <a:picLocks noChangeAspect="1"/>
+          </p:cNvPicPr>
+          <p:nvPr/>
+        </p:nvPicPr>
+        <p:blipFill>
+          <a:blip r:embed="rId3"/>
+          <a:stretch>
+            <a:fillRect/>
+          </a:stretch>
+        </p:blipFill>
+        <p:spPr>
+          <a:xfrm>
+            <a:off x="4120234" y="1847835"/>
+            <a:ext cx="3797536" cy="2962078"/>
+          </a:xfrm>
+          <a:prstGeom prst="rect">
+            <a:avLst/>
+          </a:prstGeom>
+        </p:spPr>
+      </p:pic>
+      <p:pic>
+        <p:nvPicPr>
+          <p:cNvPr id="7" name="Immagine 6">
+            <a:extLst>
+              <a:ext uri="{FF2B5EF4-FFF2-40B4-BE49-F238E27FC236}">
+                <a16:creationId xmlns:a16="http://schemas.microsoft.com/office/drawing/2014/main" id="{FC0D3DE1-B4D6-B525-0791-E244D38BF3F2}"/>
+              </a:ext>
+            </a:extLst>
+          </p:cNvPr>
+          <p:cNvPicPr>
+            <a:picLocks noChangeAspect="1"/>
+          </p:cNvPicPr>
+          <p:nvPr/>
+        </p:nvPicPr>
+        <p:blipFill>
+          <a:blip r:embed="rId4"/>
+          <a:stretch>
+            <a:fillRect/>
+          </a:stretch>
+        </p:blipFill>
+        <p:spPr>
+          <a:xfrm>
+            <a:off x="177011" y="1843088"/>
+            <a:ext cx="3797536" cy="2895620"/>
+          </a:xfrm>
+          <a:prstGeom prst="rect">
+            <a:avLst/>
+          </a:prstGeom>
+        </p:spPr>
+      </p:pic>
+      <p:sp>
+        <p:nvSpPr>
+          <p:cNvPr id="15" name="CasellaDiTesto 14">
+            <a:extLst>
+              <a:ext uri="{FF2B5EF4-FFF2-40B4-BE49-F238E27FC236}">
+                <a16:creationId xmlns:a16="http://schemas.microsoft.com/office/drawing/2014/main" id="{BD7C613C-1214-8C01-E592-3490771DF823}"/>
+              </a:ext>
+            </a:extLst>
+          </p:cNvPr>
+          <p:cNvSpPr txBox="1"/>
+          <p:nvPr/>
+        </p:nvSpPr>
+        <p:spPr>
+          <a:xfrm>
+            <a:off x="560951" y="5141459"/>
+            <a:ext cx="11067047" cy="1384995"/>
+          </a:xfrm>
+          <a:prstGeom prst="rect">
+            <a:avLst/>
+          </a:prstGeom>
+          <a:noFill/>
+        </p:spPr>
+        <p:txBody>
+          <a:bodyPr wrap="square">
+            <a:spAutoFit/>
+          </a:bodyPr>
+          <a:lstStyle/>
+          <a:p>
+            <a:pPr marL="285750" indent="-285750">
+              <a:buFontTx/>
+              <a:buChar char="-"/>
+            </a:pPr>
+            <a:r>
+              <a:rPr lang="it-IT" sz="1400" dirty="0"/>
+              <a:t>Essendo un grafo su un argomento molto specifico, ogni argomento tende a formare un cluster di articoli strettamente correlati, poiché i ricercatori citano prevalentemente lavori all'interno dello stesso tema.</a:t>
+            </a:r>
+          </a:p>
+          <a:p>
+            <a:pPr marL="285750" indent="-285750">
+              <a:buFontTx/>
+              <a:buChar char="-"/>
+            </a:pPr>
+            <a:endParaRPr lang="it-IT" sz="1400" dirty="0"/>
+          </a:p>
+          <a:p>
+            <a:pPr marL="285750" indent="-285750">
+              <a:buFontTx/>
+              <a:buChar char="-"/>
+            </a:pPr>
+            <a:r>
+              <a:rPr lang="it-IT" sz="1400" dirty="0"/>
+              <a:t>I ricercatori tendono a lavorare in gruppi o collaborazioni che producono insiemi di articoli correlati</a:t>
+            </a:r>
+          </a:p>
+          <a:p>
+            <a:pPr marL="285750" indent="-285750">
+              <a:buFontTx/>
+              <a:buChar char="-"/>
+            </a:pPr>
+            <a:endParaRPr lang="it-IT" sz="1400" dirty="0"/>
+          </a:p>
+          <a:p>
+            <a:pPr marL="285750" indent="-285750">
+              <a:buFontTx/>
+              <a:buChar char="-"/>
+            </a:pPr>
+            <a:r>
+              <a:rPr lang="it-IT" sz="1400" dirty="0"/>
+              <a:t>Gli articoli tendono a citare lavori precedenti dello stesso campo, creando cluster densi all'interno di </a:t>
+            </a:r>
+            <a:r>
+              <a:rPr lang="it-IT" sz="1400" dirty="0" err="1"/>
+              <a:t>sottodiscipline</a:t>
+            </a:r>
+            <a:r>
+              <a:rPr lang="it-IT" sz="1400" dirty="0"/>
+              <a:t> specifiche.</a:t>
+            </a:r>
+          </a:p>
+        </p:txBody>
+      </p:sp>
+      <p:sp>
+        <p:nvSpPr>
+          <p:cNvPr id="18" name="Titolo 1">
+            <a:extLst>
+              <a:ext uri="{FF2B5EF4-FFF2-40B4-BE49-F238E27FC236}">
+                <a16:creationId xmlns:a16="http://schemas.microsoft.com/office/drawing/2014/main" id="{3323BA77-0722-9279-F5DD-77B017FA3FC4}"/>
+              </a:ext>
+            </a:extLst>
+          </p:cNvPr>
+          <p:cNvSpPr>
+            <a:spLocks noGrp="1"/>
+          </p:cNvSpPr>
+          <p:nvPr>
+            <p:ph type="title"/>
+          </p:nvPr>
+        </p:nvSpPr>
+        <p:spPr>
+          <a:xfrm>
+            <a:off x="838200" y="365125"/>
+            <a:ext cx="10515600" cy="1325563"/>
+          </a:xfrm>
+        </p:spPr>
+        <p:txBody>
+          <a:bodyPr/>
+          <a:lstStyle/>
+          <a:p>
+            <a:pPr algn="ctr"/>
+            <a:r>
+              <a:rPr lang="it-IT" dirty="0">
+                <a:solidFill>
+                  <a:srgbClr val="0070C0"/>
+                </a:solidFill>
+              </a:rPr>
+              <a:t>Community </a:t>
+            </a:r>
+            <a:r>
+              <a:rPr lang="it-IT" dirty="0" err="1">
+                <a:solidFill>
+                  <a:srgbClr val="0070C0"/>
+                </a:solidFill>
+              </a:rPr>
+              <a:t>detection</a:t>
+            </a:r>
+            <a:endParaRPr lang="it-IT" dirty="0">
+              <a:solidFill>
+                <a:srgbClr val="0070C0"/>
+              </a:solidFill>
+            </a:endParaRPr>
+          </a:p>
+        </p:txBody>
+      </p:sp>
+    </p:spTree>
+    <p:extLst>
+      <p:ext uri="{BB962C8B-B14F-4D97-AF65-F5344CB8AC3E}">
+        <p14:creationId xmlns:p14="http://schemas.microsoft.com/office/powerpoint/2010/main" val="2636795374"/>
+      </p:ext>
+    </p:extLst>
+  </p:cSld>
+  <p:clrMapOvr>
+    <a:masterClrMapping/>
+  </p:clrMapOvr>
+</p:sld>
+</file>
+
+<file path=ppt/slides/slide18.xml><?xml version="1.0" encoding="utf-8"?>
+<p:sld xmlns:a="http://schemas.openxmlformats.org/drawingml/2006/main" xmlns:r="http://schemas.openxmlformats.org/officeDocument/2006/relationships" xmlns:p="http://schemas.openxmlformats.org/presentationml/2006/main">
+  <p:cSld>
+    <p:bg>
+      <p:bgPr>
+        <a:solidFill>
+          <a:schemeClr val="bg1"/>
+        </a:solidFill>
+        <a:effectLst/>
+      </p:bgPr>
+    </p:bg>
+    <p:spTree>
+      <p:nvGrpSpPr>
+        <p:cNvPr id="1" name=""/>
+        <p:cNvGrpSpPr/>
+        <p:nvPr/>
+      </p:nvGrpSpPr>
+      <p:grpSpPr>
+        <a:xfrm>
+          <a:off x="0" y="0"/>
+          <a:ext cx="0" cy="0"/>
+          <a:chOff x="0" y="0"/>
+          <a:chExt cx="0" cy="0"/>
+        </a:xfrm>
+      </p:grpSpPr>
+      <p:sp useBgFill="1">
+        <p:nvSpPr>
+          <p:cNvPr id="16" name="Rectangle 15">
+            <a:extLst>
+              <a:ext uri="{FF2B5EF4-FFF2-40B4-BE49-F238E27FC236}">
+                <a16:creationId xmlns:a16="http://schemas.microsoft.com/office/drawing/2014/main" id="{70155189-D96C-4527-B0EC-654B946BE615}"/>
+              </a:ext>
+              <a:ext uri="{C183D7F6-B498-43B3-948B-1728B52AA6E4}">
+                <adec:decorative xmlns:adec="http://schemas.microsoft.com/office/drawing/2017/decorative" val="1"/>
+              </a:ext>
+            </a:extLst>
+          </p:cNvPr>
+          <p:cNvSpPr>
+            <a:spLocks noGrp="1" noRot="1" noChangeAspect="1" noMove="1" noResize="1" noEditPoints="1" noAdjustHandles="1" noChangeArrowheads="1" noChangeShapeType="1" noTextEdit="1"/>
+          </p:cNvSpPr>
+          <p:nvPr>
+            <p:extLst>
+              <p:ext uri="{386F3935-93C4-4BCD-93E2-E3B085C9AB24}">
+                <p16:designElem xmlns:p16="http://schemas.microsoft.com/office/powerpoint/2015/main" val="1"/>
+              </p:ext>
+            </p:extLst>
+          </p:nvPr>
+        </p:nvSpPr>
+        <p:spPr>
+          <a:xfrm>
+            <a:off x="-1" y="0"/>
+            <a:ext cx="12188952" cy="6858000"/>
+          </a:xfrm>
+          <a:prstGeom prst="rect">
+            <a:avLst/>
+          </a:prstGeom>
+          <a:ln>
+            <a:noFill/>
+          </a:ln>
+        </p:spPr>
+        <p:style>
+          <a:lnRef idx="2">
+            <a:schemeClr val="accent1">
+              <a:shade val="50000"/>
+            </a:schemeClr>
+          </a:lnRef>
+          <a:fillRef idx="1">
+            <a:schemeClr val="accent1"/>
+          </a:fillRef>
+          <a:effectRef idx="0">
+            <a:schemeClr val="accent1"/>
+          </a:effectRef>
+          <a:fontRef idx="minor">
+            <a:schemeClr val="lt1"/>
+          </a:fontRef>
+        </p:style>
+        <p:txBody>
+          <a:bodyPr rtlCol="0" anchor="ctr"/>
+          <a:lstStyle/>
+          <a:p>
+            <a:pPr algn="ctr"/>
+            <a:endParaRPr lang="en-US"/>
+          </a:p>
+        </p:txBody>
+      </p:sp>
+      <p:sp>
+        <p:nvSpPr>
+          <p:cNvPr id="15" name="CasellaDiTesto 14">
+            <a:extLst>
+              <a:ext uri="{FF2B5EF4-FFF2-40B4-BE49-F238E27FC236}">
+                <a16:creationId xmlns:a16="http://schemas.microsoft.com/office/drawing/2014/main" id="{BD7C613C-1214-8C01-E592-3490771DF823}"/>
+              </a:ext>
+            </a:extLst>
+          </p:cNvPr>
+          <p:cNvSpPr txBox="1"/>
+          <p:nvPr/>
+        </p:nvSpPr>
+        <p:spPr>
+          <a:xfrm>
+            <a:off x="560951" y="4826675"/>
+            <a:ext cx="11067047" cy="2031325"/>
+          </a:xfrm>
+          <a:prstGeom prst="rect">
+            <a:avLst/>
+          </a:prstGeom>
+          <a:noFill/>
+        </p:spPr>
+        <p:txBody>
+          <a:bodyPr wrap="square">
+            <a:spAutoFit/>
+          </a:bodyPr>
+          <a:lstStyle/>
+          <a:p>
+            <a:pPr marL="285750" indent="-285750">
+              <a:buFontTx/>
+              <a:buChar char="-"/>
+            </a:pPr>
+            <a:r>
+              <a:rPr lang="it-IT" sz="1400" dirty="0"/>
+              <a:t>Label </a:t>
+            </a:r>
+            <a:r>
+              <a:rPr lang="it-IT" sz="1400" dirty="0" err="1"/>
+              <a:t>propagation</a:t>
+            </a:r>
+            <a:r>
+              <a:rPr lang="en-US" sz="1400" dirty="0"/>
+              <a:t>: </a:t>
+            </a:r>
+            <a:r>
+              <a:rPr lang="it-IT" sz="1400" dirty="0"/>
+              <a:t>grande variabilità nelle dimensioni delle comunità, con alcune comunità molto grandi. Questo potrebbe indicare la presenza di un hub o di un nodo altamente centrale che domina (lavori molto citati).</a:t>
+            </a:r>
+          </a:p>
+          <a:p>
+            <a:pPr marL="285750" indent="-285750">
+              <a:buFontTx/>
+              <a:buChar char="-"/>
+            </a:pPr>
+            <a:endParaRPr lang="it-IT" sz="1400" dirty="0"/>
+          </a:p>
+          <a:p>
+            <a:pPr marL="285750" indent="-285750">
+              <a:buFontTx/>
+              <a:buChar char="-"/>
+            </a:pPr>
+            <a:r>
+              <a:rPr lang="it-IT" sz="1400" dirty="0" err="1"/>
+              <a:t>Louvain</a:t>
+            </a:r>
+            <a:r>
+              <a:rPr lang="it-IT" sz="1400" dirty="0"/>
+              <a:t>: Mostra una moderata variabilità nelle dimensioni delle comunità, con comunità generalmente più grandi rispetto a label </a:t>
+            </a:r>
+            <a:r>
+              <a:rPr lang="it-IT" sz="1400" dirty="0" err="1"/>
+              <a:t>propagation</a:t>
+            </a:r>
+            <a:r>
+              <a:rPr lang="it-IT" sz="1400" dirty="0"/>
+              <a:t> ma senza dimensioni estreme. Questo potrebbe indicare una struttura comunitaria più equilibrata.</a:t>
+            </a:r>
+          </a:p>
+          <a:p>
+            <a:pPr marL="285750" indent="-285750">
+              <a:buFontTx/>
+              <a:buChar char="-"/>
+            </a:pPr>
+            <a:endParaRPr lang="it-IT" sz="1400" dirty="0"/>
+          </a:p>
+          <a:p>
+            <a:pPr marL="285750" indent="-285750">
+              <a:buFontTx/>
+              <a:buChar char="-"/>
+            </a:pPr>
+            <a:r>
+              <a:rPr lang="it-IT" sz="1400" dirty="0" err="1"/>
+              <a:t>Infomap</a:t>
+            </a:r>
+            <a:r>
+              <a:rPr lang="it-IT" sz="1400" dirty="0"/>
+              <a:t>: Caratterizzata da comunità di dimensioni più uniformi e generalmente più piccole. Questo potrebbe indicare una suddivisione più fine della rete in comunità di dimensioni simili.</a:t>
+            </a:r>
+          </a:p>
+          <a:p>
+            <a:pPr marL="285750" indent="-285750">
+              <a:buFontTx/>
+              <a:buChar char="-"/>
+            </a:pPr>
+            <a:endParaRPr lang="it-IT" sz="1400" dirty="0"/>
+          </a:p>
+        </p:txBody>
+      </p:sp>
+      <p:sp>
+        <p:nvSpPr>
+          <p:cNvPr id="18" name="Titolo 1">
+            <a:extLst>
+              <a:ext uri="{FF2B5EF4-FFF2-40B4-BE49-F238E27FC236}">
+                <a16:creationId xmlns:a16="http://schemas.microsoft.com/office/drawing/2014/main" id="{3323BA77-0722-9279-F5DD-77B017FA3FC4}"/>
+              </a:ext>
+            </a:extLst>
+          </p:cNvPr>
+          <p:cNvSpPr>
+            <a:spLocks noGrp="1"/>
+          </p:cNvSpPr>
+          <p:nvPr>
+            <p:ph type="title"/>
+          </p:nvPr>
+        </p:nvSpPr>
+        <p:spPr>
+          <a:xfrm>
+            <a:off x="838200" y="365125"/>
+            <a:ext cx="10515600" cy="1325563"/>
+          </a:xfrm>
+        </p:spPr>
+        <p:txBody>
+          <a:bodyPr/>
+          <a:lstStyle/>
+          <a:p>
+            <a:pPr algn="ctr"/>
+            <a:r>
+              <a:rPr lang="it-IT" dirty="0">
+                <a:solidFill>
+                  <a:srgbClr val="0070C0"/>
+                </a:solidFill>
+              </a:rPr>
+              <a:t>Community </a:t>
+            </a:r>
+            <a:r>
+              <a:rPr lang="it-IT" dirty="0" err="1">
+                <a:solidFill>
+                  <a:srgbClr val="0070C0"/>
+                </a:solidFill>
+              </a:rPr>
+              <a:t>detection</a:t>
+            </a:r>
+            <a:endParaRPr lang="it-IT" dirty="0">
+              <a:solidFill>
+                <a:srgbClr val="0070C0"/>
+              </a:solidFill>
+            </a:endParaRPr>
+          </a:p>
+        </p:txBody>
+      </p:sp>
+      <p:pic>
+        <p:nvPicPr>
+          <p:cNvPr id="3" name="Immagine 2">
+            <a:extLst>
+              <a:ext uri="{FF2B5EF4-FFF2-40B4-BE49-F238E27FC236}">
+                <a16:creationId xmlns:a16="http://schemas.microsoft.com/office/drawing/2014/main" id="{482A0FA7-2AEF-B837-D61B-2F5FCD9B732C}"/>
+              </a:ext>
+            </a:extLst>
+          </p:cNvPr>
+          <p:cNvPicPr>
+            <a:picLocks noChangeAspect="1"/>
+          </p:cNvPicPr>
+          <p:nvPr/>
+        </p:nvPicPr>
+        <p:blipFill>
+          <a:blip r:embed="rId2"/>
+          <a:stretch>
+            <a:fillRect/>
+          </a:stretch>
+        </p:blipFill>
+        <p:spPr>
+          <a:xfrm>
+            <a:off x="674735" y="1905357"/>
+            <a:ext cx="4572998" cy="2469101"/>
+          </a:xfrm>
+          <a:prstGeom prst="rect">
+            <a:avLst/>
+          </a:prstGeom>
+        </p:spPr>
+      </p:pic>
+      <p:pic>
+        <p:nvPicPr>
+          <p:cNvPr id="5" name="Immagine 4">
+            <a:extLst>
+              <a:ext uri="{FF2B5EF4-FFF2-40B4-BE49-F238E27FC236}">
+                <a16:creationId xmlns:a16="http://schemas.microsoft.com/office/drawing/2014/main" id="{3EDF1FDA-9455-A238-7E27-68C6BB47BB99}"/>
+              </a:ext>
+            </a:extLst>
+          </p:cNvPr>
+          <p:cNvPicPr>
+            <a:picLocks noChangeAspect="1"/>
+          </p:cNvPicPr>
+          <p:nvPr/>
+        </p:nvPicPr>
+        <p:blipFill>
+          <a:blip r:embed="rId3"/>
+          <a:stretch>
+            <a:fillRect/>
+          </a:stretch>
+        </p:blipFill>
+        <p:spPr>
+          <a:xfrm>
+            <a:off x="6083562" y="2283546"/>
+            <a:ext cx="5487166" cy="2025334"/>
+          </a:xfrm>
+          <a:prstGeom prst="rect">
+            <a:avLst/>
+          </a:prstGeom>
+        </p:spPr>
+      </p:pic>
+      <p:sp>
+        <p:nvSpPr>
+          <p:cNvPr id="6" name="CasellaDiTesto 5">
+            <a:extLst>
+              <a:ext uri="{FF2B5EF4-FFF2-40B4-BE49-F238E27FC236}">
+                <a16:creationId xmlns:a16="http://schemas.microsoft.com/office/drawing/2014/main" id="{3E339F38-633F-6F28-C653-2322D8044E5F}"/>
+              </a:ext>
+            </a:extLst>
+          </p:cNvPr>
+          <p:cNvSpPr txBox="1"/>
+          <p:nvPr/>
+        </p:nvSpPr>
+        <p:spPr>
+          <a:xfrm>
+            <a:off x="6137025" y="1905357"/>
+            <a:ext cx="5380240" cy="307777"/>
+          </a:xfrm>
+          <a:prstGeom prst="rect">
+            <a:avLst/>
+          </a:prstGeom>
+          <a:noFill/>
+        </p:spPr>
+        <p:txBody>
+          <a:bodyPr wrap="square" rtlCol="0">
+            <a:spAutoFit/>
+          </a:bodyPr>
+          <a:lstStyle/>
+          <a:p>
+            <a:r>
+              <a:rPr lang="it-IT" sz="1400" dirty="0"/>
+              <a:t>Confronto dei diversi algoritmi attraverso l'analisi della modularità:</a:t>
+            </a:r>
+          </a:p>
+        </p:txBody>
+      </p:sp>
+    </p:spTree>
+    <p:extLst>
+      <p:ext uri="{BB962C8B-B14F-4D97-AF65-F5344CB8AC3E}">
+        <p14:creationId xmlns:p14="http://schemas.microsoft.com/office/powerpoint/2010/main" val="1223718585"/>
+      </p:ext>
+    </p:extLst>
+  </p:cSld>
+  <p:clrMapOvr>
+    <a:masterClrMapping/>
+  </p:clrMapOvr>
+</p:sld>
+</file>
+
+<file path=ppt/slides/slide19.xml><?xml version="1.0" encoding="utf-8"?>
+<p:sld xmlns:a="http://schemas.openxmlformats.org/drawingml/2006/main" xmlns:r="http://schemas.openxmlformats.org/officeDocument/2006/relationships" xmlns:p="http://schemas.openxmlformats.org/presentationml/2006/main">
+  <p:cSld>
+    <p:bg>
+      <p:bgPr>
+        <a:solidFill>
+          <a:schemeClr val="bg1"/>
+        </a:solidFill>
+        <a:effectLst/>
+      </p:bgPr>
+    </p:bg>
+    <p:spTree>
+      <p:nvGrpSpPr>
+        <p:cNvPr id="1" name=""/>
+        <p:cNvGrpSpPr/>
+        <p:nvPr/>
+      </p:nvGrpSpPr>
+      <p:grpSpPr>
+        <a:xfrm>
+          <a:off x="0" y="0"/>
+          <a:ext cx="0" cy="0"/>
+          <a:chOff x="0" y="0"/>
+          <a:chExt cx="0" cy="0"/>
+        </a:xfrm>
+      </p:grpSpPr>
+      <p:sp useBgFill="1">
+        <p:nvSpPr>
+          <p:cNvPr id="16" name="Rectangle 15">
+            <a:extLst>
+              <a:ext uri="{FF2B5EF4-FFF2-40B4-BE49-F238E27FC236}">
+                <a16:creationId xmlns:a16="http://schemas.microsoft.com/office/drawing/2014/main" id="{70155189-D96C-4527-B0EC-654B946BE615}"/>
+              </a:ext>
+              <a:ext uri="{C183D7F6-B498-43B3-948B-1728B52AA6E4}">
+                <adec:decorative xmlns:adec="http://schemas.microsoft.com/office/drawing/2017/decorative" val="1"/>
+              </a:ext>
+            </a:extLst>
+          </p:cNvPr>
+          <p:cNvSpPr>
+            <a:spLocks noGrp="1" noRot="1" noChangeAspect="1" noMove="1" noResize="1" noEditPoints="1" noAdjustHandles="1" noChangeArrowheads="1" noChangeShapeType="1" noTextEdit="1"/>
+          </p:cNvSpPr>
+          <p:nvPr>
+            <p:extLst>
+              <p:ext uri="{386F3935-93C4-4BCD-93E2-E3B085C9AB24}">
+                <p16:designElem xmlns:p16="http://schemas.microsoft.com/office/powerpoint/2015/main" val="1"/>
+              </p:ext>
+            </p:extLst>
+          </p:nvPr>
+        </p:nvSpPr>
+        <p:spPr>
+          <a:xfrm>
+            <a:off x="-1" y="0"/>
+            <a:ext cx="12188952" cy="6858000"/>
+          </a:xfrm>
+          <a:prstGeom prst="rect">
+            <a:avLst/>
+          </a:prstGeom>
+          <a:ln>
+            <a:noFill/>
+          </a:ln>
+        </p:spPr>
+        <p:style>
+          <a:lnRef idx="2">
+            <a:schemeClr val="accent1">
+              <a:shade val="50000"/>
+            </a:schemeClr>
+          </a:lnRef>
+          <a:fillRef idx="1">
+            <a:schemeClr val="accent1"/>
+          </a:fillRef>
+          <a:effectRef idx="0">
+            <a:schemeClr val="accent1"/>
+          </a:effectRef>
+          <a:fontRef idx="minor">
+            <a:schemeClr val="lt1"/>
+          </a:fontRef>
+        </p:style>
+        <p:txBody>
+          <a:bodyPr rtlCol="0" anchor="ctr"/>
+          <a:lstStyle/>
+          <a:p>
+            <a:pPr algn="ctr"/>
+            <a:endParaRPr lang="en-US"/>
+          </a:p>
+        </p:txBody>
+      </p:sp>
+      <p:sp>
+        <p:nvSpPr>
+          <p:cNvPr id="15" name="CasellaDiTesto 14">
+            <a:extLst>
+              <a:ext uri="{FF2B5EF4-FFF2-40B4-BE49-F238E27FC236}">
+                <a16:creationId xmlns:a16="http://schemas.microsoft.com/office/drawing/2014/main" id="{BD7C613C-1214-8C01-E592-3490771DF823}"/>
+              </a:ext>
+            </a:extLst>
+          </p:cNvPr>
+          <p:cNvSpPr txBox="1"/>
+          <p:nvPr/>
+        </p:nvSpPr>
+        <p:spPr>
+          <a:xfrm>
+            <a:off x="634103" y="1690688"/>
+            <a:ext cx="11067047" cy="738664"/>
+          </a:xfrm>
+          <a:prstGeom prst="rect">
+            <a:avLst/>
+          </a:prstGeom>
+          <a:noFill/>
+        </p:spPr>
+        <p:txBody>
+          <a:bodyPr wrap="square">
+            <a:spAutoFit/>
+          </a:bodyPr>
+          <a:lstStyle/>
+          <a:p>
+            <a:r>
+              <a:rPr lang="it-IT" sz="1400" dirty="0"/>
+              <a:t>Per una visualizzazione più semplice utilizziamo </a:t>
+            </a:r>
+            <a:r>
+              <a:rPr lang="it-IT" sz="1400" dirty="0" err="1">
+                <a:solidFill>
+                  <a:schemeClr val="accent3"/>
+                </a:solidFill>
+              </a:rPr>
+              <a:t>viz</a:t>
+            </a:r>
+            <a:r>
+              <a:rPr lang="it-IT" sz="1400" dirty="0" err="1">
+                <a:solidFill>
+                  <a:srgbClr val="FFC000"/>
+                </a:solidFill>
+              </a:rPr>
+              <a:t>.plot_community_graph</a:t>
+            </a:r>
+            <a:r>
+              <a:rPr lang="it-IT" sz="1400" dirty="0"/>
+              <a:t>, che permette di collassare tutte le comunità in nodi, generando le comunità di dimensione proporzionale al numero di nodi che fanno parte della comunità e gli archi sono pesati e di dimensione variabile in base al numero di archi che intercorrono tra le comunità (</a:t>
+            </a:r>
+            <a:r>
+              <a:rPr lang="en-US" sz="1400" dirty="0">
+                <a:solidFill>
+                  <a:schemeClr val="accent6"/>
+                </a:solidFill>
+              </a:rPr>
+              <a:t>#top_k = 10</a:t>
+            </a:r>
+            <a:r>
+              <a:rPr lang="en-US" sz="1400" dirty="0"/>
+              <a:t> per </a:t>
+            </a:r>
+            <a:r>
+              <a:rPr lang="en-US" sz="1400" dirty="0" err="1"/>
+              <a:t>visualizzare</a:t>
+            </a:r>
+            <a:r>
+              <a:rPr lang="en-US" sz="1400" dirty="0"/>
+              <a:t> le prime </a:t>
+            </a:r>
+            <a:r>
+              <a:rPr lang="en-US" sz="1400" dirty="0" err="1"/>
+              <a:t>comunità</a:t>
+            </a:r>
+            <a:r>
+              <a:rPr lang="en-US" sz="1400" dirty="0"/>
+              <a:t> </a:t>
+            </a:r>
+            <a:r>
+              <a:rPr lang="en-US" sz="1400" dirty="0" err="1"/>
+              <a:t>più</a:t>
+            </a:r>
+            <a:r>
+              <a:rPr lang="en-US" sz="1400" dirty="0"/>
+              <a:t> </a:t>
+            </a:r>
+            <a:r>
+              <a:rPr lang="en-US" sz="1400" dirty="0" err="1"/>
+              <a:t>influenti</a:t>
+            </a:r>
+            <a:r>
+              <a:rPr lang="it-IT" sz="1400" dirty="0"/>
+              <a:t>)</a:t>
+            </a:r>
+          </a:p>
+        </p:txBody>
+      </p:sp>
+      <p:sp>
+        <p:nvSpPr>
+          <p:cNvPr id="18" name="Titolo 1">
+            <a:extLst>
+              <a:ext uri="{FF2B5EF4-FFF2-40B4-BE49-F238E27FC236}">
+                <a16:creationId xmlns:a16="http://schemas.microsoft.com/office/drawing/2014/main" id="{3323BA77-0722-9279-F5DD-77B017FA3FC4}"/>
+              </a:ext>
+            </a:extLst>
+          </p:cNvPr>
+          <p:cNvSpPr>
+            <a:spLocks noGrp="1"/>
+          </p:cNvSpPr>
+          <p:nvPr>
+            <p:ph type="title"/>
+          </p:nvPr>
+        </p:nvSpPr>
+        <p:spPr>
+          <a:xfrm>
+            <a:off x="838200" y="365125"/>
+            <a:ext cx="10515600" cy="1325563"/>
+          </a:xfrm>
+        </p:spPr>
+        <p:txBody>
+          <a:bodyPr/>
+          <a:lstStyle/>
+          <a:p>
+            <a:pPr algn="ctr"/>
+            <a:r>
+              <a:rPr lang="it-IT" dirty="0">
+                <a:solidFill>
+                  <a:srgbClr val="0070C0"/>
+                </a:solidFill>
+              </a:rPr>
+              <a:t>Community </a:t>
+            </a:r>
+            <a:r>
+              <a:rPr lang="it-IT" dirty="0" err="1">
+                <a:solidFill>
+                  <a:srgbClr val="0070C0"/>
+                </a:solidFill>
+              </a:rPr>
+              <a:t>detection</a:t>
+            </a:r>
+            <a:endParaRPr lang="it-IT" dirty="0">
+              <a:solidFill>
+                <a:srgbClr val="0070C0"/>
+              </a:solidFill>
+            </a:endParaRPr>
+          </a:p>
+        </p:txBody>
+      </p:sp>
+      <p:pic>
+        <p:nvPicPr>
+          <p:cNvPr id="8" name="Immagine 7">
+            <a:extLst>
+              <a:ext uri="{FF2B5EF4-FFF2-40B4-BE49-F238E27FC236}">
+                <a16:creationId xmlns:a16="http://schemas.microsoft.com/office/drawing/2014/main" id="{61853A85-64C4-4A31-6B89-8C36A1C4299F}"/>
+              </a:ext>
+            </a:extLst>
+          </p:cNvPr>
+          <p:cNvPicPr>
+            <a:picLocks noChangeAspect="1"/>
+          </p:cNvPicPr>
+          <p:nvPr/>
+        </p:nvPicPr>
+        <p:blipFill rotWithShape="1">
+          <a:blip r:embed="rId3"/>
+          <a:srcRect l="7226" t="12729" r="14624" b="4140"/>
+          <a:stretch/>
+        </p:blipFill>
+        <p:spPr>
+          <a:xfrm>
+            <a:off x="838200" y="3211427"/>
+            <a:ext cx="2929813" cy="2864498"/>
+          </a:xfrm>
+          <a:prstGeom prst="rect">
+            <a:avLst/>
+          </a:prstGeom>
+        </p:spPr>
+      </p:pic>
+      <p:pic>
+        <p:nvPicPr>
+          <p:cNvPr id="10" name="Immagine 9">
+            <a:extLst>
+              <a:ext uri="{FF2B5EF4-FFF2-40B4-BE49-F238E27FC236}">
+                <a16:creationId xmlns:a16="http://schemas.microsoft.com/office/drawing/2014/main" id="{3EDA9972-5663-662B-5EBA-5E81D8E67058}"/>
+              </a:ext>
+            </a:extLst>
+          </p:cNvPr>
+          <p:cNvPicPr>
+            <a:picLocks noChangeAspect="1"/>
+          </p:cNvPicPr>
+          <p:nvPr/>
+        </p:nvPicPr>
+        <p:blipFill rotWithShape="1">
+          <a:blip r:embed="rId4"/>
+          <a:srcRect l="7452" t="12920" r="12757" b="4470"/>
+          <a:stretch/>
+        </p:blipFill>
+        <p:spPr>
+          <a:xfrm>
+            <a:off x="4934338" y="3211427"/>
+            <a:ext cx="2929813" cy="2882538"/>
+          </a:xfrm>
+          <a:prstGeom prst="rect">
+            <a:avLst/>
+          </a:prstGeom>
+        </p:spPr>
+      </p:pic>
+      <p:pic>
+        <p:nvPicPr>
+          <p:cNvPr id="14" name="Immagine 13">
+            <a:extLst>
+              <a:ext uri="{FF2B5EF4-FFF2-40B4-BE49-F238E27FC236}">
+                <a16:creationId xmlns:a16="http://schemas.microsoft.com/office/drawing/2014/main" id="{650AD181-D33D-A7CD-C147-D8D9A622C914}"/>
+              </a:ext>
+            </a:extLst>
+          </p:cNvPr>
+          <p:cNvPicPr>
+            <a:picLocks noChangeAspect="1"/>
+          </p:cNvPicPr>
+          <p:nvPr/>
+        </p:nvPicPr>
+        <p:blipFill>
+          <a:blip r:embed="rId5"/>
+          <a:stretch>
+            <a:fillRect/>
+          </a:stretch>
+        </p:blipFill>
+        <p:spPr>
+          <a:xfrm>
+            <a:off x="8702352" y="3167278"/>
+            <a:ext cx="2947503" cy="2908647"/>
+          </a:xfrm>
+          <a:prstGeom prst="rect">
+            <a:avLst/>
+          </a:prstGeom>
+        </p:spPr>
+      </p:pic>
+      <p:sp>
+        <p:nvSpPr>
+          <p:cNvPr id="17" name="CasellaDiTesto 16">
+            <a:extLst>
+              <a:ext uri="{FF2B5EF4-FFF2-40B4-BE49-F238E27FC236}">
+                <a16:creationId xmlns:a16="http://schemas.microsoft.com/office/drawing/2014/main" id="{E6D98B48-0E20-DCE5-F16C-E53F04539B8B}"/>
+              </a:ext>
+            </a:extLst>
+          </p:cNvPr>
+          <p:cNvSpPr txBox="1"/>
+          <p:nvPr/>
+        </p:nvSpPr>
+        <p:spPr>
+          <a:xfrm>
+            <a:off x="1198954" y="2852572"/>
+            <a:ext cx="2817845" cy="369332"/>
+          </a:xfrm>
+          <a:prstGeom prst="rect">
+            <a:avLst/>
+          </a:prstGeom>
+          <a:noFill/>
+        </p:spPr>
+        <p:txBody>
+          <a:bodyPr wrap="square" rtlCol="0">
+            <a:spAutoFit/>
+          </a:bodyPr>
+          <a:lstStyle/>
+          <a:p>
+            <a:pPr algn="ctr"/>
+            <a:r>
+              <a:rPr lang="en-US" dirty="0"/>
+              <a:t>Label propagation</a:t>
+            </a:r>
+            <a:endParaRPr lang="it-IT" dirty="0"/>
+          </a:p>
+        </p:txBody>
+      </p:sp>
+      <p:sp>
+        <p:nvSpPr>
+          <p:cNvPr id="19" name="CasellaDiTesto 18">
+            <a:extLst>
+              <a:ext uri="{FF2B5EF4-FFF2-40B4-BE49-F238E27FC236}">
+                <a16:creationId xmlns:a16="http://schemas.microsoft.com/office/drawing/2014/main" id="{1030DDBD-E1F9-A516-93B1-FB2930D9DC45}"/>
+              </a:ext>
+            </a:extLst>
+          </p:cNvPr>
+          <p:cNvSpPr txBox="1"/>
+          <p:nvPr/>
+        </p:nvSpPr>
+        <p:spPr>
+          <a:xfrm>
+            <a:off x="4685552" y="2852572"/>
+            <a:ext cx="2817845" cy="369332"/>
+          </a:xfrm>
+          <a:prstGeom prst="rect">
+            <a:avLst/>
+          </a:prstGeom>
+          <a:noFill/>
+        </p:spPr>
+        <p:txBody>
+          <a:bodyPr wrap="square" rtlCol="0">
+            <a:spAutoFit/>
+          </a:bodyPr>
+          <a:lstStyle/>
+          <a:p>
+            <a:pPr algn="ctr"/>
+            <a:r>
+              <a:rPr lang="en-US" dirty="0"/>
+              <a:t>Louvain</a:t>
+            </a:r>
+            <a:endParaRPr lang="it-IT" dirty="0"/>
+          </a:p>
+        </p:txBody>
+      </p:sp>
+      <p:sp>
+        <p:nvSpPr>
+          <p:cNvPr id="20" name="CasellaDiTesto 19">
+            <a:extLst>
+              <a:ext uri="{FF2B5EF4-FFF2-40B4-BE49-F238E27FC236}">
+                <a16:creationId xmlns:a16="http://schemas.microsoft.com/office/drawing/2014/main" id="{F30ED55C-FCBC-58F1-01CF-D165317FC0F3}"/>
+              </a:ext>
+            </a:extLst>
+          </p:cNvPr>
+          <p:cNvSpPr txBox="1"/>
+          <p:nvPr/>
+        </p:nvSpPr>
+        <p:spPr>
+          <a:xfrm>
+            <a:off x="8767180" y="2852572"/>
+            <a:ext cx="2817845" cy="369332"/>
+          </a:xfrm>
+          <a:prstGeom prst="rect">
+            <a:avLst/>
+          </a:prstGeom>
+          <a:noFill/>
+        </p:spPr>
+        <p:txBody>
+          <a:bodyPr wrap="square" rtlCol="0">
+            <a:spAutoFit/>
+          </a:bodyPr>
+          <a:lstStyle/>
+          <a:p>
+            <a:pPr algn="ctr"/>
+            <a:r>
+              <a:rPr lang="en-US" dirty="0" err="1"/>
+              <a:t>Infomap</a:t>
+            </a:r>
+            <a:endParaRPr lang="it-IT" dirty="0"/>
+          </a:p>
+        </p:txBody>
+      </p:sp>
+    </p:spTree>
+    <p:extLst>
+      <p:ext uri="{BB962C8B-B14F-4D97-AF65-F5344CB8AC3E}">
+        <p14:creationId xmlns:p14="http://schemas.microsoft.com/office/powerpoint/2010/main" val="486763196"/>
       </p:ext>
     </p:extLst>
   </p:cSld>
@@ -6148,6 +7970,425 @@
     <p:extLst>
       <p:ext uri="{BB962C8B-B14F-4D97-AF65-F5344CB8AC3E}">
         <p14:creationId xmlns:p14="http://schemas.microsoft.com/office/powerpoint/2010/main" val="2806341576"/>
+      </p:ext>
+    </p:extLst>
+  </p:cSld>
+  <p:clrMapOvr>
+    <a:masterClrMapping/>
+  </p:clrMapOvr>
+</p:sld>
+</file>
+
+<file path=ppt/slides/slide20.xml><?xml version="1.0" encoding="utf-8"?>
+<p:sld xmlns:a="http://schemas.openxmlformats.org/drawingml/2006/main" xmlns:r="http://schemas.openxmlformats.org/officeDocument/2006/relationships" xmlns:p="http://schemas.openxmlformats.org/presentationml/2006/main">
+  <p:cSld>
+    <p:bg>
+      <p:bgPr>
+        <a:solidFill>
+          <a:schemeClr val="bg1"/>
+        </a:solidFill>
+        <a:effectLst/>
+      </p:bgPr>
+    </p:bg>
+    <p:spTree>
+      <p:nvGrpSpPr>
+        <p:cNvPr id="1" name=""/>
+        <p:cNvGrpSpPr/>
+        <p:nvPr/>
+      </p:nvGrpSpPr>
+      <p:grpSpPr>
+        <a:xfrm>
+          <a:off x="0" y="0"/>
+          <a:ext cx="0" cy="0"/>
+          <a:chOff x="0" y="0"/>
+          <a:chExt cx="0" cy="0"/>
+        </a:xfrm>
+      </p:grpSpPr>
+      <p:sp useBgFill="1">
+        <p:nvSpPr>
+          <p:cNvPr id="16" name="Rectangle 15">
+            <a:extLst>
+              <a:ext uri="{FF2B5EF4-FFF2-40B4-BE49-F238E27FC236}">
+                <a16:creationId xmlns:a16="http://schemas.microsoft.com/office/drawing/2014/main" id="{70155189-D96C-4527-B0EC-654B946BE615}"/>
+              </a:ext>
+              <a:ext uri="{C183D7F6-B498-43B3-948B-1728B52AA6E4}">
+                <adec:decorative xmlns:adec="http://schemas.microsoft.com/office/drawing/2017/decorative" val="1"/>
+              </a:ext>
+            </a:extLst>
+          </p:cNvPr>
+          <p:cNvSpPr>
+            <a:spLocks noGrp="1" noRot="1" noChangeAspect="1" noMove="1" noResize="1" noEditPoints="1" noAdjustHandles="1" noChangeArrowheads="1" noChangeShapeType="1" noTextEdit="1"/>
+          </p:cNvSpPr>
+          <p:nvPr>
+            <p:extLst>
+              <p:ext uri="{386F3935-93C4-4BCD-93E2-E3B085C9AB24}">
+                <p16:designElem xmlns:p16="http://schemas.microsoft.com/office/powerpoint/2015/main" val="1"/>
+              </p:ext>
+            </p:extLst>
+          </p:nvPr>
+        </p:nvSpPr>
+        <p:spPr>
+          <a:xfrm>
+            <a:off x="-1" y="0"/>
+            <a:ext cx="12188952" cy="6858000"/>
+          </a:xfrm>
+          <a:prstGeom prst="rect">
+            <a:avLst/>
+          </a:prstGeom>
+          <a:ln>
+            <a:noFill/>
+          </a:ln>
+        </p:spPr>
+        <p:style>
+          <a:lnRef idx="2">
+            <a:schemeClr val="accent1">
+              <a:shade val="50000"/>
+            </a:schemeClr>
+          </a:lnRef>
+          <a:fillRef idx="1">
+            <a:schemeClr val="accent1"/>
+          </a:fillRef>
+          <a:effectRef idx="0">
+            <a:schemeClr val="accent1"/>
+          </a:effectRef>
+          <a:fontRef idx="minor">
+            <a:schemeClr val="lt1"/>
+          </a:fontRef>
+        </p:style>
+        <p:txBody>
+          <a:bodyPr rtlCol="0" anchor="ctr"/>
+          <a:lstStyle/>
+          <a:p>
+            <a:pPr algn="ctr"/>
+            <a:endParaRPr lang="en-US"/>
+          </a:p>
+        </p:txBody>
+      </p:sp>
+      <p:sp>
+        <p:nvSpPr>
+          <p:cNvPr id="15" name="CasellaDiTesto 14">
+            <a:extLst>
+              <a:ext uri="{FF2B5EF4-FFF2-40B4-BE49-F238E27FC236}">
+                <a16:creationId xmlns:a16="http://schemas.microsoft.com/office/drawing/2014/main" id="{BD7C613C-1214-8C01-E592-3490771DF823}"/>
+              </a:ext>
+            </a:extLst>
+          </p:cNvPr>
+          <p:cNvSpPr txBox="1"/>
+          <p:nvPr/>
+        </p:nvSpPr>
+        <p:spPr>
+          <a:xfrm>
+            <a:off x="368717" y="5163987"/>
+            <a:ext cx="7431115" cy="1446550"/>
+          </a:xfrm>
+          <a:prstGeom prst="rect">
+            <a:avLst/>
+          </a:prstGeom>
+          <a:noFill/>
+        </p:spPr>
+        <p:txBody>
+          <a:bodyPr wrap="square">
+            <a:spAutoFit/>
+          </a:bodyPr>
+          <a:lstStyle/>
+          <a:p>
+            <a:r>
+              <a:rPr lang="it-IT" sz="1100" dirty="0"/>
+              <a:t>Label </a:t>
+            </a:r>
+            <a:r>
+              <a:rPr lang="it-IT" sz="1100" dirty="0" err="1"/>
+              <a:t>Propagation</a:t>
+            </a:r>
+            <a:r>
+              <a:rPr lang="it-IT" sz="1100" dirty="0"/>
+              <a:t> rileva comunità con un'ampia gamma di densità interne, da molto alte a molto basse. Questo potrebbe indicare che alcune comunità sono molto ben definite mentre altre sono meno coese.</a:t>
+            </a:r>
+          </a:p>
+          <a:p>
+            <a:endParaRPr lang="it-IT" sz="1100" dirty="0"/>
+          </a:p>
+          <a:p>
+            <a:r>
+              <a:rPr lang="it-IT" sz="1100" dirty="0" err="1"/>
+              <a:t>Louvain</a:t>
+            </a:r>
+            <a:r>
+              <a:rPr lang="it-IT" sz="1100" dirty="0"/>
+              <a:t> rileva comunità con densità interne molto elevate e uniformi, confermando la sua capacità di creare comunità ben definite e dense.</a:t>
+            </a:r>
+          </a:p>
+          <a:p>
+            <a:endParaRPr lang="it-IT" sz="1100" dirty="0"/>
+          </a:p>
+          <a:p>
+            <a:r>
+              <a:rPr lang="it-IT" sz="1100" dirty="0" err="1"/>
+              <a:t>Infomap</a:t>
+            </a:r>
+            <a:r>
+              <a:rPr lang="it-IT" sz="1100" dirty="0"/>
+              <a:t> rileva comunità con una varietà di densità interne, riflettendo la sua capacità di catturare strutture più complesse e gerarchiche.</a:t>
+            </a:r>
+          </a:p>
+        </p:txBody>
+      </p:sp>
+      <p:sp>
+        <p:nvSpPr>
+          <p:cNvPr id="18" name="Titolo 1">
+            <a:extLst>
+              <a:ext uri="{FF2B5EF4-FFF2-40B4-BE49-F238E27FC236}">
+                <a16:creationId xmlns:a16="http://schemas.microsoft.com/office/drawing/2014/main" id="{3323BA77-0722-9279-F5DD-77B017FA3FC4}"/>
+              </a:ext>
+            </a:extLst>
+          </p:cNvPr>
+          <p:cNvSpPr>
+            <a:spLocks noGrp="1"/>
+          </p:cNvSpPr>
+          <p:nvPr>
+            <p:ph type="title"/>
+          </p:nvPr>
+        </p:nvSpPr>
+        <p:spPr>
+          <a:xfrm>
+            <a:off x="838200" y="365125"/>
+            <a:ext cx="10515600" cy="1325563"/>
+          </a:xfrm>
+        </p:spPr>
+        <p:txBody>
+          <a:bodyPr/>
+          <a:lstStyle/>
+          <a:p>
+            <a:pPr algn="ctr"/>
+            <a:r>
+              <a:rPr lang="it-IT" dirty="0">
+                <a:solidFill>
+                  <a:srgbClr val="0070C0"/>
+                </a:solidFill>
+              </a:rPr>
+              <a:t>Community </a:t>
+            </a:r>
+            <a:r>
+              <a:rPr lang="it-IT" dirty="0" err="1">
+                <a:solidFill>
+                  <a:srgbClr val="0070C0"/>
+                </a:solidFill>
+              </a:rPr>
+              <a:t>detection</a:t>
+            </a:r>
+            <a:endParaRPr lang="it-IT" dirty="0">
+              <a:solidFill>
+                <a:srgbClr val="0070C0"/>
+              </a:solidFill>
+            </a:endParaRPr>
+          </a:p>
+        </p:txBody>
+      </p:sp>
+      <p:pic>
+        <p:nvPicPr>
+          <p:cNvPr id="3" name="Immagine 2">
+            <a:extLst>
+              <a:ext uri="{FF2B5EF4-FFF2-40B4-BE49-F238E27FC236}">
+                <a16:creationId xmlns:a16="http://schemas.microsoft.com/office/drawing/2014/main" id="{FE0D3D5C-DBF4-29EF-9EEE-9B2DCB923880}"/>
+              </a:ext>
+            </a:extLst>
+          </p:cNvPr>
+          <p:cNvPicPr>
+            <a:picLocks noChangeAspect="1"/>
+          </p:cNvPicPr>
+          <p:nvPr/>
+        </p:nvPicPr>
+        <p:blipFill>
+          <a:blip r:embed="rId3"/>
+          <a:stretch>
+            <a:fillRect/>
+          </a:stretch>
+        </p:blipFill>
+        <p:spPr>
+          <a:xfrm>
+            <a:off x="838200" y="1731365"/>
+            <a:ext cx="4265985" cy="3185159"/>
+          </a:xfrm>
+          <a:prstGeom prst="rect">
+            <a:avLst/>
+          </a:prstGeom>
+        </p:spPr>
+      </p:pic>
+      <p:pic>
+        <p:nvPicPr>
+          <p:cNvPr id="5" name="Immagine 4">
+            <a:extLst>
+              <a:ext uri="{FF2B5EF4-FFF2-40B4-BE49-F238E27FC236}">
+                <a16:creationId xmlns:a16="http://schemas.microsoft.com/office/drawing/2014/main" id="{3CC8D141-FF9A-7174-2282-0F20BABFEE6E}"/>
+              </a:ext>
+            </a:extLst>
+          </p:cNvPr>
+          <p:cNvPicPr>
+            <a:picLocks noChangeAspect="1"/>
+          </p:cNvPicPr>
+          <p:nvPr/>
+        </p:nvPicPr>
+        <p:blipFill>
+          <a:blip r:embed="rId4"/>
+          <a:stretch>
+            <a:fillRect/>
+          </a:stretch>
+        </p:blipFill>
+        <p:spPr>
+          <a:xfrm>
+            <a:off x="7557068" y="1685857"/>
+            <a:ext cx="3940747" cy="3854348"/>
+          </a:xfrm>
+          <a:prstGeom prst="rect">
+            <a:avLst/>
+          </a:prstGeom>
+        </p:spPr>
+      </p:pic>
+      <p:sp>
+        <p:nvSpPr>
+          <p:cNvPr id="6" name="CasellaDiTesto 5">
+            <a:extLst>
+              <a:ext uri="{FF2B5EF4-FFF2-40B4-BE49-F238E27FC236}">
+                <a16:creationId xmlns:a16="http://schemas.microsoft.com/office/drawing/2014/main" id="{929FA7F4-823E-A838-07E6-456005C4C673}"/>
+              </a:ext>
+            </a:extLst>
+          </p:cNvPr>
+          <p:cNvSpPr txBox="1"/>
+          <p:nvPr/>
+        </p:nvSpPr>
+        <p:spPr>
+          <a:xfrm>
+            <a:off x="1344168" y="1413001"/>
+            <a:ext cx="3940746" cy="307777"/>
+          </a:xfrm>
+          <a:prstGeom prst="rect">
+            <a:avLst/>
+          </a:prstGeom>
+          <a:noFill/>
+        </p:spPr>
+        <p:txBody>
+          <a:bodyPr wrap="square" rtlCol="0">
+            <a:spAutoFit/>
+          </a:bodyPr>
+          <a:lstStyle/>
+          <a:p>
+            <a:r>
+              <a:rPr lang="it-IT" sz="1400" dirty="0"/>
+              <a:t>Come la fitness si distribuisce nelle comunità</a:t>
+            </a:r>
+          </a:p>
+        </p:txBody>
+      </p:sp>
+      <p:sp>
+        <p:nvSpPr>
+          <p:cNvPr id="7" name="CasellaDiTesto 6">
+            <a:extLst>
+              <a:ext uri="{FF2B5EF4-FFF2-40B4-BE49-F238E27FC236}">
+                <a16:creationId xmlns:a16="http://schemas.microsoft.com/office/drawing/2014/main" id="{36B4C5E8-E1B0-7869-ED61-0FE67BAFC2E6}"/>
+              </a:ext>
+            </a:extLst>
+          </p:cNvPr>
+          <p:cNvSpPr txBox="1"/>
+          <p:nvPr/>
+        </p:nvSpPr>
+        <p:spPr>
+          <a:xfrm>
+            <a:off x="7542366" y="1413001"/>
+            <a:ext cx="3940746" cy="307777"/>
+          </a:xfrm>
+          <a:prstGeom prst="rect">
+            <a:avLst/>
+          </a:prstGeom>
+          <a:noFill/>
+        </p:spPr>
+        <p:txBody>
+          <a:bodyPr wrap="square" rtlCol="0">
+            <a:spAutoFit/>
+          </a:bodyPr>
+          <a:lstStyle/>
+          <a:p>
+            <a:pPr algn="ctr"/>
+            <a:r>
+              <a:rPr lang="it-IT" sz="1400" dirty="0"/>
+              <a:t>Matrice di </a:t>
+            </a:r>
+            <a:r>
+              <a:rPr lang="it-IT" sz="1400" dirty="0" err="1"/>
+              <a:t>similirità</a:t>
+            </a:r>
+            <a:endParaRPr lang="it-IT" sz="1400" dirty="0"/>
+          </a:p>
+        </p:txBody>
+      </p:sp>
+      <p:sp>
+        <p:nvSpPr>
+          <p:cNvPr id="9" name="CasellaDiTesto 8">
+            <a:extLst>
+              <a:ext uri="{FF2B5EF4-FFF2-40B4-BE49-F238E27FC236}">
+                <a16:creationId xmlns:a16="http://schemas.microsoft.com/office/drawing/2014/main" id="{263C8523-578E-829B-5E56-43C752B57A1F}"/>
+              </a:ext>
+            </a:extLst>
+          </p:cNvPr>
+          <p:cNvSpPr txBox="1"/>
+          <p:nvPr/>
+        </p:nvSpPr>
+        <p:spPr>
+          <a:xfrm>
+            <a:off x="8339328" y="5475828"/>
+            <a:ext cx="2889504" cy="830997"/>
+          </a:xfrm>
+          <a:prstGeom prst="rect">
+            <a:avLst/>
+          </a:prstGeom>
+          <a:noFill/>
+        </p:spPr>
+        <p:txBody>
+          <a:bodyPr wrap="square" rtlCol="0">
+            <a:spAutoFit/>
+          </a:bodyPr>
+          <a:lstStyle/>
+          <a:p>
+            <a:pPr algn="ctr"/>
+            <a:r>
+              <a:rPr lang="it-IT" sz="1200" dirty="0"/>
+              <a:t>Label </a:t>
+            </a:r>
+            <a:r>
+              <a:rPr lang="it-IT" sz="1200" dirty="0" err="1"/>
+              <a:t>Propagation</a:t>
+            </a:r>
+            <a:r>
+              <a:rPr lang="it-IT" sz="1200" dirty="0"/>
+              <a:t> e </a:t>
+            </a:r>
+            <a:r>
+              <a:rPr lang="it-IT" sz="1200" dirty="0" err="1"/>
+              <a:t>Louvain</a:t>
+            </a:r>
+            <a:r>
+              <a:rPr lang="it-IT" sz="1200" dirty="0"/>
+              <a:t> identificano comunità significativamente diverse rispetto a </a:t>
+            </a:r>
+            <a:r>
+              <a:rPr lang="it-IT" sz="1200" dirty="0" err="1"/>
+              <a:t>Infomap</a:t>
+            </a:r>
+            <a:r>
+              <a:rPr lang="it-IT" sz="1200" dirty="0"/>
+              <a:t>, che mostra una moderata somiglianza con </a:t>
+            </a:r>
+            <a:r>
+              <a:rPr lang="it-IT" sz="1200" dirty="0" err="1"/>
+              <a:t>Louvain</a:t>
+            </a:r>
+            <a:endParaRPr lang="it-IT" sz="1200" dirty="0"/>
+          </a:p>
+        </p:txBody>
+      </p:sp>
+    </p:spTree>
+    <p:extLst>
+      <p:ext uri="{BB962C8B-B14F-4D97-AF65-F5344CB8AC3E}">
+        <p14:creationId xmlns:p14="http://schemas.microsoft.com/office/powerpoint/2010/main" val="4023032818"/>
       </p:ext>
     </p:extLst>
   </p:cSld>
@@ -7667,4 +9908,319 @@
     </a:ext>
   </a:extLst>
 </a:theme>
+</file>
+
+<file path=ppt/theme/theme2.xml><?xml version="1.0" encoding="utf-8"?>
+<a:theme xmlns:a="http://schemas.openxmlformats.org/drawingml/2006/main" name="Tema di Office">
+  <a:themeElements>
+    <a:clrScheme name="Office">
+      <a:dk1>
+        <a:sysClr val="windowText" lastClr="000000"/>
+      </a:dk1>
+      <a:lt1>
+        <a:sysClr val="window" lastClr="FFFFFF"/>
+      </a:lt1>
+      <a:dk2>
+        <a:srgbClr val="0E2841"/>
+      </a:dk2>
+      <a:lt2>
+        <a:srgbClr val="E8E8E8"/>
+      </a:lt2>
+      <a:accent1>
+        <a:srgbClr val="156082"/>
+      </a:accent1>
+      <a:accent2>
+        <a:srgbClr val="E97132"/>
+      </a:accent2>
+      <a:accent3>
+        <a:srgbClr val="196B24"/>
+      </a:accent3>
+      <a:accent4>
+        <a:srgbClr val="0F9ED5"/>
+      </a:accent4>
+      <a:accent5>
+        <a:srgbClr val="A02B93"/>
+      </a:accent5>
+      <a:accent6>
+        <a:srgbClr val="4EA72E"/>
+      </a:accent6>
+      <a:hlink>
+        <a:srgbClr val="467886"/>
+      </a:hlink>
+      <a:folHlink>
+        <a:srgbClr val="96607D"/>
+      </a:folHlink>
+    </a:clrScheme>
+    <a:fontScheme name="Office">
+      <a:majorFont>
+        <a:latin typeface="Aptos Display" panose="02110004020202020204"/>
+        <a:ea typeface=""/>
+        <a:cs typeface=""/>
+        <a:font script="Jpan" typeface="游ゴシック Light"/>
+        <a:font script="Hang" typeface="맑은 고딕"/>
+        <a:font script="Hans" typeface="等线 Light"/>
+        <a:font script="Hant" typeface="新細明體"/>
+        <a:font script="Arab" typeface="Times New Roman"/>
+        <a:font script="Hebr" typeface="Times New Roman"/>
+        <a:font script="Thai" typeface="Angsana New"/>
+        <a:font script="Ethi" typeface="Nyala"/>
+        <a:font script="Beng" typeface="Vrinda"/>
+        <a:font script="Gujr" typeface="Shruti"/>
+        <a:font script="Khmr" typeface="MoolBoran"/>
+        <a:font script="Knda" typeface="Tunga"/>
+        <a:font script="Guru" typeface="Raavi"/>
+        <a:font script="Cans" typeface="Euphemia"/>
+        <a:font script="Cher" typeface="Plantagenet Cherokee"/>
+        <a:font script="Yiii" typeface="Microsoft Yi Baiti"/>
+        <a:font script="Tibt" typeface="Microsoft Himalaya"/>
+        <a:font script="Thaa" typeface="MV Boli"/>
+        <a:font script="Deva" typeface="Mangal"/>
+        <a:font script="Telu" typeface="Gautami"/>
+        <a:font script="Taml" typeface="Latha"/>
+        <a:font script="Syrc" typeface="Estrangelo Edessa"/>
+        <a:font script="Orya" typeface="Kalinga"/>
+        <a:font script="Mlym" typeface="Kartika"/>
+        <a:font script="Laoo" typeface="DokChampa"/>
+        <a:font script="Sinh" typeface="Iskoola Pota"/>
+        <a:font script="Mong" typeface="Mongolian Baiti"/>
+        <a:font script="Viet" typeface="Times New Roman"/>
+        <a:font script="Uigh" typeface="Microsoft Uighur"/>
+        <a:font script="Geor" typeface="Sylfaen"/>
+        <a:font script="Armn" typeface="Arial"/>
+        <a:font script="Bugi" typeface="Leelawadee UI"/>
+        <a:font script="Bopo" typeface="Microsoft JhengHei"/>
+        <a:font script="Java" typeface="Javanese Text"/>
+        <a:font script="Lisu" typeface="Segoe UI"/>
+        <a:font script="Mymr" typeface="Myanmar Text"/>
+        <a:font script="Nkoo" typeface="Ebrima"/>
+        <a:font script="Olck" typeface="Nirmala UI"/>
+        <a:font script="Osma" typeface="Ebrima"/>
+        <a:font script="Phag" typeface="Phagspa"/>
+        <a:font script="Syrn" typeface="Estrangelo Edessa"/>
+        <a:font script="Syrj" typeface="Estrangelo Edessa"/>
+        <a:font script="Syre" typeface="Estrangelo Edessa"/>
+        <a:font script="Sora" typeface="Nirmala UI"/>
+        <a:font script="Tale" typeface="Microsoft Tai Le"/>
+        <a:font script="Talu" typeface="Microsoft New Tai Lue"/>
+        <a:font script="Tfng" typeface="Ebrima"/>
+      </a:majorFont>
+      <a:minorFont>
+        <a:latin typeface="Aptos" panose="02110004020202020204"/>
+        <a:ea typeface=""/>
+        <a:cs typeface=""/>
+        <a:font script="Jpan" typeface="游ゴシック"/>
+        <a:font script="Hang" typeface="맑은 고딕"/>
+        <a:font script="Hans" typeface="等线"/>
+        <a:font script="Hant" typeface="新細明體"/>
+        <a:font script="Arab" typeface="Arial"/>
+        <a:font script="Hebr" typeface="Arial"/>
+        <a:font script="Thai" typeface="Cordia New"/>
+        <a:font script="Ethi" typeface="Nyala"/>
+        <a:font script="Beng" typeface="Vrinda"/>
+        <a:font script="Gujr" typeface="Shruti"/>
+        <a:font script="Khmr" typeface="DaunPenh"/>
+        <a:font script="Knda" typeface="Tunga"/>
+        <a:font script="Guru" typeface="Raavi"/>
+        <a:font script="Cans" typeface="Euphemia"/>
+        <a:font script="Cher" typeface="Plantagenet Cherokee"/>
+        <a:font script="Yiii" typeface="Microsoft Yi Baiti"/>
+        <a:font script="Tibt" typeface="Microsoft Himalaya"/>
+        <a:font script="Thaa" typeface="MV Boli"/>
+        <a:font script="Deva" typeface="Mangal"/>
+        <a:font script="Telu" typeface="Gautami"/>
+        <a:font script="Taml" typeface="Latha"/>
+        <a:font script="Syrc" typeface="Estrangelo Edessa"/>
+        <a:font script="Orya" typeface="Kalinga"/>
+        <a:font script="Mlym" typeface="Kartika"/>
+        <a:font script="Laoo" typeface="DokChampa"/>
+        <a:font script="Sinh" typeface="Iskoola Pota"/>
+        <a:font script="Mong" typeface="Mongolian Baiti"/>
+        <a:font script="Viet" typeface="Arial"/>
+        <a:font script="Uigh" typeface="Microsoft Uighur"/>
+        <a:font script="Geor" typeface="Sylfaen"/>
+        <a:font script="Armn" typeface="Arial"/>
+        <a:font script="Bugi" typeface="Leelawadee UI"/>
+        <a:font script="Bopo" typeface="Microsoft JhengHei"/>
+        <a:font script="Java" typeface="Javanese Text"/>
+        <a:font script="Lisu" typeface="Segoe UI"/>
+        <a:font script="Mymr" typeface="Myanmar Text"/>
+        <a:font script="Nkoo" typeface="Ebrima"/>
+        <a:font script="Olck" typeface="Nirmala UI"/>
+        <a:font script="Osma" typeface="Ebrima"/>
+        <a:font script="Phag" typeface="Phagspa"/>
+        <a:font script="Syrn" typeface="Estrangelo Edessa"/>
+        <a:font script="Syrj" typeface="Estrangelo Edessa"/>
+        <a:font script="Syre" typeface="Estrangelo Edessa"/>
+        <a:font script="Sora" typeface="Nirmala UI"/>
+        <a:font script="Tale" typeface="Microsoft Tai Le"/>
+        <a:font script="Talu" typeface="Microsoft New Tai Lue"/>
+        <a:font script="Tfng" typeface="Ebrima"/>
+      </a:minorFont>
+    </a:fontScheme>
+    <a:fmtScheme name="Office">
+      <a:fillStyleLst>
+        <a:solidFill>
+          <a:schemeClr val="phClr"/>
+        </a:solidFill>
+        <a:gradFill rotWithShape="1">
+          <a:gsLst>
+            <a:gs pos="0">
+              <a:schemeClr val="phClr">
+                <a:lumMod val="110000"/>
+                <a:satMod val="105000"/>
+                <a:tint val="67000"/>
+              </a:schemeClr>
+            </a:gs>
+            <a:gs pos="50000">
+              <a:schemeClr val="phClr">
+                <a:lumMod val="105000"/>
+                <a:satMod val="103000"/>
+                <a:tint val="73000"/>
+              </a:schemeClr>
+            </a:gs>
+            <a:gs pos="100000">
+              <a:schemeClr val="phClr">
+                <a:lumMod val="105000"/>
+                <a:satMod val="109000"/>
+                <a:tint val="81000"/>
+              </a:schemeClr>
+            </a:gs>
+          </a:gsLst>
+          <a:lin ang="5400000" scaled="0"/>
+        </a:gradFill>
+        <a:gradFill rotWithShape="1">
+          <a:gsLst>
+            <a:gs pos="0">
+              <a:schemeClr val="phClr">
+                <a:satMod val="103000"/>
+                <a:lumMod val="102000"/>
+                <a:tint val="94000"/>
+              </a:schemeClr>
+            </a:gs>
+            <a:gs pos="50000">
+              <a:schemeClr val="phClr">
+                <a:satMod val="110000"/>
+                <a:lumMod val="100000"/>
+                <a:shade val="100000"/>
+              </a:schemeClr>
+            </a:gs>
+            <a:gs pos="100000">
+              <a:schemeClr val="phClr">
+                <a:lumMod val="99000"/>
+                <a:satMod val="120000"/>
+                <a:shade val="78000"/>
+              </a:schemeClr>
+            </a:gs>
+          </a:gsLst>
+          <a:lin ang="5400000" scaled="0"/>
+        </a:gradFill>
+      </a:fillStyleLst>
+      <a:lnStyleLst>
+        <a:ln w="12700" cap="flat" cmpd="sng" algn="ctr">
+          <a:solidFill>
+            <a:schemeClr val="phClr"/>
+          </a:solidFill>
+          <a:prstDash val="solid"/>
+          <a:miter lim="800000"/>
+        </a:ln>
+        <a:ln w="19050" cap="flat" cmpd="sng" algn="ctr">
+          <a:solidFill>
+            <a:schemeClr val="phClr"/>
+          </a:solidFill>
+          <a:prstDash val="solid"/>
+          <a:miter lim="800000"/>
+        </a:ln>
+        <a:ln w="25400" cap="flat" cmpd="sng" algn="ctr">
+          <a:solidFill>
+            <a:schemeClr val="phClr"/>
+          </a:solidFill>
+          <a:prstDash val="solid"/>
+          <a:miter lim="800000"/>
+        </a:ln>
+      </a:lnStyleLst>
+      <a:effectStyleLst>
+        <a:effectStyle>
+          <a:effectLst/>
+        </a:effectStyle>
+        <a:effectStyle>
+          <a:effectLst/>
+        </a:effectStyle>
+        <a:effectStyle>
+          <a:effectLst>
+            <a:outerShdw blurRad="57150" dist="19050" dir="5400000" algn="ctr" rotWithShape="0">
+              <a:srgbClr val="000000">
+                <a:alpha val="63000"/>
+              </a:srgbClr>
+            </a:outerShdw>
+          </a:effectLst>
+        </a:effectStyle>
+      </a:effectStyleLst>
+      <a:bgFillStyleLst>
+        <a:solidFill>
+          <a:schemeClr val="phClr"/>
+        </a:solidFill>
+        <a:solidFill>
+          <a:schemeClr val="phClr">
+            <a:tint val="95000"/>
+            <a:satMod val="170000"/>
+          </a:schemeClr>
+        </a:solidFill>
+        <a:gradFill rotWithShape="1">
+          <a:gsLst>
+            <a:gs pos="0">
+              <a:schemeClr val="phClr">
+                <a:tint val="93000"/>
+                <a:satMod val="150000"/>
+                <a:shade val="98000"/>
+                <a:lumMod val="102000"/>
+              </a:schemeClr>
+            </a:gs>
+            <a:gs pos="50000">
+              <a:schemeClr val="phClr">
+                <a:tint val="98000"/>
+                <a:satMod val="130000"/>
+                <a:shade val="90000"/>
+                <a:lumMod val="103000"/>
+              </a:schemeClr>
+            </a:gs>
+            <a:gs pos="100000">
+              <a:schemeClr val="phClr">
+                <a:shade val="63000"/>
+                <a:satMod val="120000"/>
+              </a:schemeClr>
+            </a:gs>
+          </a:gsLst>
+          <a:lin ang="5400000" scaled="0"/>
+        </a:gradFill>
+      </a:bgFillStyleLst>
+    </a:fmtScheme>
+  </a:themeElements>
+  <a:objectDefaults>
+    <a:lnDef>
+      <a:spPr/>
+      <a:bodyPr/>
+      <a:lstStyle/>
+      <a:style>
+        <a:lnRef idx="2">
+          <a:schemeClr val="accent1"/>
+        </a:lnRef>
+        <a:fillRef idx="0">
+          <a:schemeClr val="accent1"/>
+        </a:fillRef>
+        <a:effectRef idx="1">
+          <a:schemeClr val="accent1"/>
+        </a:effectRef>
+        <a:fontRef idx="minor">
+          <a:schemeClr val="tx1"/>
+        </a:fontRef>
+      </a:style>
+    </a:lnDef>
+  </a:objectDefaults>
+  <a:extraClrSchemeLst/>
+  <a:extLst>
+    <a:ext uri="{05A4C25C-085E-4340-85A3-A5531E510DB2}">
+      <thm15:themeFamily xmlns:thm15="http://schemas.microsoft.com/office/thememl/2012/main" name="Office Theme" id="{2E142A2C-CD16-42D6-873A-C26D2A0506FA}" vid="{1BDDFF52-6CD6-40A5-AB3C-68EB2F1E4D0A}"/>
+    </a:ext>
+  </a:extLst>
+</a:theme>
 </file>
</xml_diff>